<commit_message>
Update for Arm and license
</commit_message>
<xml_diff>
--- a/arm-map/allinea_map.pptx
+++ b/arm-map/allinea_map.pptx
@@ -218,7 +218,7 @@
           <a:p>
             <a:fld id="{DCBCB4EF-AF11-42C5-A407-C6B5B92B4E13}" type="datetimeFigureOut">
               <a:rPr lang="nl-BE" smtClean="0"/>
-              <a:t>17/01/2018</a:t>
+              <a:t>28/01/2020</a:t>
             </a:fld>
             <a:endParaRPr lang="nl-BE"/>
           </a:p>
@@ -282,35 +282,35 @@
           <a:p>
             <a:pPr lvl="0"/>
             <a:r>
-              <a:rPr lang="en-US" smtClean="0"/>
+              <a:rPr lang="en-US"/>
               <a:t>Click to edit Master text styles</a:t>
             </a:r>
           </a:p>
           <a:p>
             <a:pPr lvl="1"/>
             <a:r>
-              <a:rPr lang="en-US" smtClean="0"/>
+              <a:rPr lang="en-US"/>
               <a:t>Second level</a:t>
             </a:r>
           </a:p>
           <a:p>
             <a:pPr lvl="2"/>
             <a:r>
-              <a:rPr lang="en-US" smtClean="0"/>
+              <a:rPr lang="en-US"/>
               <a:t>Third level</a:t>
             </a:r>
           </a:p>
           <a:p>
             <a:pPr lvl="3"/>
             <a:r>
-              <a:rPr lang="en-US" smtClean="0"/>
+              <a:rPr lang="en-US"/>
               <a:t>Fourth level</a:t>
             </a:r>
           </a:p>
           <a:p>
             <a:pPr lvl="4"/>
             <a:r>
-              <a:rPr lang="en-US" smtClean="0"/>
+              <a:rPr lang="en-US"/>
               <a:t>Fifth level</a:t>
             </a:r>
             <a:endParaRPr lang="nl-BE"/>
@@ -612,7 +612,7 @@
           </a:lstStyle>
           <a:p>
             <a:r>
-              <a:rPr lang="en-US" smtClean="0"/>
+              <a:rPr lang="en-US"/>
               <a:t>Click to edit Master title style</a:t>
             </a:r>
             <a:endParaRPr lang="en-US" dirty="0"/>
@@ -677,7 +677,7 @@
           </a:lstStyle>
           <a:p>
             <a:r>
-              <a:rPr lang="en-US" smtClean="0"/>
+              <a:rPr lang="en-US"/>
               <a:t>Click to edit Master subtitle style</a:t>
             </a:r>
             <a:endParaRPr lang="en-US" dirty="0"/>
@@ -701,7 +701,7 @@
           <a:p>
             <a:fld id="{16EF12B4-B810-4A0E-8BE8-50A63E57FF46}" type="datetime1">
               <a:rPr lang="nl-BE" smtClean="0"/>
-              <a:t>17/01/2018</a:t>
+              <a:t>28/01/2020</a:t>
             </a:fld>
             <a:endParaRPr lang="nl-BE"/>
           </a:p>
@@ -795,7 +795,7 @@
           <a:lstStyle/>
           <a:p>
             <a:r>
-              <a:rPr lang="en-US" smtClean="0"/>
+              <a:rPr lang="en-US"/>
               <a:t>Click to edit Master title style</a:t>
             </a:r>
             <a:endParaRPr lang="en-US" dirty="0"/>
@@ -819,35 +819,35 @@
           <a:p>
             <a:pPr lvl="0"/>
             <a:r>
-              <a:rPr lang="en-US" smtClean="0"/>
+              <a:rPr lang="en-US"/>
               <a:t>Click to edit Master text styles</a:t>
             </a:r>
           </a:p>
           <a:p>
             <a:pPr lvl="1"/>
             <a:r>
-              <a:rPr lang="en-US" smtClean="0"/>
+              <a:rPr lang="en-US"/>
               <a:t>Second level</a:t>
             </a:r>
           </a:p>
           <a:p>
             <a:pPr lvl="2"/>
             <a:r>
-              <a:rPr lang="en-US" smtClean="0"/>
+              <a:rPr lang="en-US"/>
               <a:t>Third level</a:t>
             </a:r>
           </a:p>
           <a:p>
             <a:pPr lvl="3"/>
             <a:r>
-              <a:rPr lang="en-US" smtClean="0"/>
+              <a:rPr lang="en-US"/>
               <a:t>Fourth level</a:t>
             </a:r>
           </a:p>
           <a:p>
             <a:pPr lvl="4"/>
             <a:r>
-              <a:rPr lang="en-US" smtClean="0"/>
+              <a:rPr lang="en-US"/>
               <a:t>Fifth level</a:t>
             </a:r>
             <a:endParaRPr lang="en-US" dirty="0"/>
@@ -871,7 +871,7 @@
           <a:p>
             <a:fld id="{1C4C54F0-81EA-4EDD-8D8A-D45FC20BB49D}" type="datetime1">
               <a:rPr lang="nl-BE" smtClean="0"/>
-              <a:t>17/01/2018</a:t>
+              <a:t>28/01/2020</a:t>
             </a:fld>
             <a:endParaRPr lang="nl-BE"/>
           </a:p>
@@ -970,7 +970,7 @@
           <a:lstStyle/>
           <a:p>
             <a:r>
-              <a:rPr lang="en-US" smtClean="0"/>
+              <a:rPr lang="en-US"/>
               <a:t>Click to edit Master title style</a:t>
             </a:r>
             <a:endParaRPr lang="en-US" dirty="0"/>
@@ -999,35 +999,35 @@
           <a:p>
             <a:pPr lvl="0"/>
             <a:r>
-              <a:rPr lang="en-US" smtClean="0"/>
+              <a:rPr lang="en-US"/>
               <a:t>Click to edit Master text styles</a:t>
             </a:r>
           </a:p>
           <a:p>
             <a:pPr lvl="1"/>
             <a:r>
-              <a:rPr lang="en-US" smtClean="0"/>
+              <a:rPr lang="en-US"/>
               <a:t>Second level</a:t>
             </a:r>
           </a:p>
           <a:p>
             <a:pPr lvl="2"/>
             <a:r>
-              <a:rPr lang="en-US" smtClean="0"/>
+              <a:rPr lang="en-US"/>
               <a:t>Third level</a:t>
             </a:r>
           </a:p>
           <a:p>
             <a:pPr lvl="3"/>
             <a:r>
-              <a:rPr lang="en-US" smtClean="0"/>
+              <a:rPr lang="en-US"/>
               <a:t>Fourth level</a:t>
             </a:r>
           </a:p>
           <a:p>
             <a:pPr lvl="4"/>
             <a:r>
-              <a:rPr lang="en-US" smtClean="0"/>
+              <a:rPr lang="en-US"/>
               <a:t>Fifth level</a:t>
             </a:r>
             <a:endParaRPr lang="en-US" dirty="0"/>
@@ -1051,7 +1051,7 @@
           <a:p>
             <a:fld id="{C777687B-F7A2-4048-B084-F43AE07119BE}" type="datetime1">
               <a:rPr lang="nl-BE" smtClean="0"/>
-              <a:t>17/01/2018</a:t>
+              <a:t>28/01/2020</a:t>
             </a:fld>
             <a:endParaRPr lang="nl-BE"/>
           </a:p>
@@ -1145,7 +1145,7 @@
           <a:lstStyle/>
           <a:p>
             <a:r>
-              <a:rPr lang="en-US" smtClean="0"/>
+              <a:rPr lang="en-US"/>
               <a:t>Click to edit Master title style</a:t>
             </a:r>
             <a:endParaRPr lang="en-US" dirty="0"/>
@@ -1169,35 +1169,35 @@
           <a:p>
             <a:pPr lvl="0"/>
             <a:r>
-              <a:rPr lang="en-US" smtClean="0"/>
+              <a:rPr lang="en-US"/>
               <a:t>Click to edit Master text styles</a:t>
             </a:r>
           </a:p>
           <a:p>
             <a:pPr lvl="1"/>
             <a:r>
-              <a:rPr lang="en-US" smtClean="0"/>
+              <a:rPr lang="en-US"/>
               <a:t>Second level</a:t>
             </a:r>
           </a:p>
           <a:p>
             <a:pPr lvl="2"/>
             <a:r>
-              <a:rPr lang="en-US" smtClean="0"/>
+              <a:rPr lang="en-US"/>
               <a:t>Third level</a:t>
             </a:r>
           </a:p>
           <a:p>
             <a:pPr lvl="3"/>
             <a:r>
-              <a:rPr lang="en-US" smtClean="0"/>
+              <a:rPr lang="en-US"/>
               <a:t>Fourth level</a:t>
             </a:r>
           </a:p>
           <a:p>
             <a:pPr lvl="4"/>
             <a:r>
-              <a:rPr lang="en-US" smtClean="0"/>
+              <a:rPr lang="en-US"/>
               <a:t>Fifth level</a:t>
             </a:r>
             <a:endParaRPr lang="en-US" dirty="0"/>
@@ -1221,7 +1221,7 @@
           <a:p>
             <a:fld id="{17D68A66-8CE0-4AE5-B09A-AFB1DA1D35B7}" type="datetime1">
               <a:rPr lang="nl-BE" smtClean="0"/>
-              <a:t>17/01/2018</a:t>
+              <a:t>28/01/2020</a:t>
             </a:fld>
             <a:endParaRPr lang="nl-BE"/>
           </a:p>
@@ -1324,7 +1324,7 @@
           </a:lstStyle>
           <a:p>
             <a:r>
-              <a:rPr lang="en-US" smtClean="0"/>
+              <a:rPr lang="en-US"/>
               <a:t>Click to edit Master title style</a:t>
             </a:r>
             <a:endParaRPr lang="en-US" dirty="0"/>
@@ -1442,7 +1442,7 @@
           <a:p>
             <a:pPr lvl="0"/>
             <a:r>
-              <a:rPr lang="en-US" smtClean="0"/>
+              <a:rPr lang="en-US"/>
               <a:t>Click to edit Master text styles</a:t>
             </a:r>
           </a:p>
@@ -1465,7 +1465,7 @@
           <a:p>
             <a:fld id="{ACD2EF45-07D9-47DD-8D2C-044FB9A2A8C8}" type="datetime1">
               <a:rPr lang="nl-BE" smtClean="0"/>
-              <a:t>17/01/2018</a:t>
+              <a:t>28/01/2020</a:t>
             </a:fld>
             <a:endParaRPr lang="nl-BE"/>
           </a:p>
@@ -1559,7 +1559,7 @@
           <a:lstStyle/>
           <a:p>
             <a:r>
-              <a:rPr lang="en-US" smtClean="0"/>
+              <a:rPr lang="en-US"/>
               <a:t>Click to edit Master title style</a:t>
             </a:r>
             <a:endParaRPr lang="en-US" dirty="0"/>
@@ -1588,35 +1588,35 @@
           <a:p>
             <a:pPr lvl="0"/>
             <a:r>
-              <a:rPr lang="en-US" smtClean="0"/>
+              <a:rPr lang="en-US"/>
               <a:t>Click to edit Master text styles</a:t>
             </a:r>
           </a:p>
           <a:p>
             <a:pPr lvl="1"/>
             <a:r>
-              <a:rPr lang="en-US" smtClean="0"/>
+              <a:rPr lang="en-US"/>
               <a:t>Second level</a:t>
             </a:r>
           </a:p>
           <a:p>
             <a:pPr lvl="2"/>
             <a:r>
-              <a:rPr lang="en-US" smtClean="0"/>
+              <a:rPr lang="en-US"/>
               <a:t>Third level</a:t>
             </a:r>
           </a:p>
           <a:p>
             <a:pPr lvl="3"/>
             <a:r>
-              <a:rPr lang="en-US" smtClean="0"/>
+              <a:rPr lang="en-US"/>
               <a:t>Fourth level</a:t>
             </a:r>
           </a:p>
           <a:p>
             <a:pPr lvl="4"/>
             <a:r>
-              <a:rPr lang="en-US" smtClean="0"/>
+              <a:rPr lang="en-US"/>
               <a:t>Fifth level</a:t>
             </a:r>
             <a:endParaRPr lang="en-US" dirty="0"/>
@@ -1645,35 +1645,35 @@
           <a:p>
             <a:pPr lvl="0"/>
             <a:r>
-              <a:rPr lang="en-US" smtClean="0"/>
+              <a:rPr lang="en-US"/>
               <a:t>Click to edit Master text styles</a:t>
             </a:r>
           </a:p>
           <a:p>
             <a:pPr lvl="1"/>
             <a:r>
-              <a:rPr lang="en-US" smtClean="0"/>
+              <a:rPr lang="en-US"/>
               <a:t>Second level</a:t>
             </a:r>
           </a:p>
           <a:p>
             <a:pPr lvl="2"/>
             <a:r>
-              <a:rPr lang="en-US" smtClean="0"/>
+              <a:rPr lang="en-US"/>
               <a:t>Third level</a:t>
             </a:r>
           </a:p>
           <a:p>
             <a:pPr lvl="3"/>
             <a:r>
-              <a:rPr lang="en-US" smtClean="0"/>
+              <a:rPr lang="en-US"/>
               <a:t>Fourth level</a:t>
             </a:r>
           </a:p>
           <a:p>
             <a:pPr lvl="4"/>
             <a:r>
-              <a:rPr lang="en-US" smtClean="0"/>
+              <a:rPr lang="en-US"/>
               <a:t>Fifth level</a:t>
             </a:r>
             <a:endParaRPr lang="en-US" dirty="0"/>
@@ -1697,7 +1697,7 @@
           <a:p>
             <a:fld id="{C1AA2C35-BB49-44DC-82C3-3BD7F8F0132B}" type="datetime1">
               <a:rPr lang="nl-BE" smtClean="0"/>
-              <a:t>17/01/2018</a:t>
+              <a:t>28/01/2020</a:t>
             </a:fld>
             <a:endParaRPr lang="nl-BE"/>
           </a:p>
@@ -1796,7 +1796,7 @@
           <a:lstStyle/>
           <a:p>
             <a:r>
-              <a:rPr lang="en-US" smtClean="0"/>
+              <a:rPr lang="en-US"/>
               <a:t>Click to edit Master title style</a:t>
             </a:r>
             <a:endParaRPr lang="en-US" dirty="0"/>
@@ -1862,7 +1862,7 @@
           <a:p>
             <a:pPr lvl="0"/>
             <a:r>
-              <a:rPr lang="en-US" smtClean="0"/>
+              <a:rPr lang="en-US"/>
               <a:t>Click to edit Master text styles</a:t>
             </a:r>
           </a:p>
@@ -1890,35 +1890,35 @@
           <a:p>
             <a:pPr lvl="0"/>
             <a:r>
-              <a:rPr lang="en-US" smtClean="0"/>
+              <a:rPr lang="en-US"/>
               <a:t>Click to edit Master text styles</a:t>
             </a:r>
           </a:p>
           <a:p>
             <a:pPr lvl="1"/>
             <a:r>
-              <a:rPr lang="en-US" smtClean="0"/>
+              <a:rPr lang="en-US"/>
               <a:t>Second level</a:t>
             </a:r>
           </a:p>
           <a:p>
             <a:pPr lvl="2"/>
             <a:r>
-              <a:rPr lang="en-US" smtClean="0"/>
+              <a:rPr lang="en-US"/>
               <a:t>Third level</a:t>
             </a:r>
           </a:p>
           <a:p>
             <a:pPr lvl="3"/>
             <a:r>
-              <a:rPr lang="en-US" smtClean="0"/>
+              <a:rPr lang="en-US"/>
               <a:t>Fourth level</a:t>
             </a:r>
           </a:p>
           <a:p>
             <a:pPr lvl="4"/>
             <a:r>
-              <a:rPr lang="en-US" smtClean="0"/>
+              <a:rPr lang="en-US"/>
               <a:t>Fifth level</a:t>
             </a:r>
             <a:endParaRPr lang="en-US" dirty="0"/>
@@ -1984,7 +1984,7 @@
           <a:p>
             <a:pPr lvl="0"/>
             <a:r>
-              <a:rPr lang="en-US" smtClean="0"/>
+              <a:rPr lang="en-US"/>
               <a:t>Click to edit Master text styles</a:t>
             </a:r>
           </a:p>
@@ -2012,35 +2012,35 @@
           <a:p>
             <a:pPr lvl="0"/>
             <a:r>
-              <a:rPr lang="en-US" smtClean="0"/>
+              <a:rPr lang="en-US"/>
               <a:t>Click to edit Master text styles</a:t>
             </a:r>
           </a:p>
           <a:p>
             <a:pPr lvl="1"/>
             <a:r>
-              <a:rPr lang="en-US" smtClean="0"/>
+              <a:rPr lang="en-US"/>
               <a:t>Second level</a:t>
             </a:r>
           </a:p>
           <a:p>
             <a:pPr lvl="2"/>
             <a:r>
-              <a:rPr lang="en-US" smtClean="0"/>
+              <a:rPr lang="en-US"/>
               <a:t>Third level</a:t>
             </a:r>
           </a:p>
           <a:p>
             <a:pPr lvl="3"/>
             <a:r>
-              <a:rPr lang="en-US" smtClean="0"/>
+              <a:rPr lang="en-US"/>
               <a:t>Fourth level</a:t>
             </a:r>
           </a:p>
           <a:p>
             <a:pPr lvl="4"/>
             <a:r>
-              <a:rPr lang="en-US" smtClean="0"/>
+              <a:rPr lang="en-US"/>
               <a:t>Fifth level</a:t>
             </a:r>
             <a:endParaRPr lang="en-US" dirty="0"/>
@@ -2064,7 +2064,7 @@
           <a:p>
             <a:fld id="{EF292103-E950-40E9-A111-1A108610AB2D}" type="datetime1">
               <a:rPr lang="nl-BE" smtClean="0"/>
-              <a:t>17/01/2018</a:t>
+              <a:t>28/01/2020</a:t>
             </a:fld>
             <a:endParaRPr lang="nl-BE"/>
           </a:p>
@@ -2158,7 +2158,7 @@
           <a:lstStyle/>
           <a:p>
             <a:r>
-              <a:rPr lang="en-US" smtClean="0"/>
+              <a:rPr lang="en-US"/>
               <a:t>Click to edit Master title style</a:t>
             </a:r>
             <a:endParaRPr lang="en-US" dirty="0"/>
@@ -2182,7 +2182,7 @@
           <a:p>
             <a:fld id="{C309520F-DE14-43BC-AF22-FA4B0586587C}" type="datetime1">
               <a:rPr lang="nl-BE" smtClean="0"/>
-              <a:t>17/01/2018</a:t>
+              <a:t>28/01/2020</a:t>
             </a:fld>
             <a:endParaRPr lang="nl-BE"/>
           </a:p>
@@ -2277,7 +2277,7 @@
           <a:p>
             <a:fld id="{89A75246-50AD-43D4-AC8F-C9CEFC06F414}" type="datetime1">
               <a:rPr lang="nl-BE" smtClean="0"/>
-              <a:t>17/01/2018</a:t>
+              <a:t>28/01/2020</a:t>
             </a:fld>
             <a:endParaRPr lang="nl-BE"/>
           </a:p>
@@ -2380,7 +2380,7 @@
           </a:lstStyle>
           <a:p>
             <a:r>
-              <a:rPr lang="en-US" smtClean="0"/>
+              <a:rPr lang="en-US"/>
               <a:t>Click to edit Master title style</a:t>
             </a:r>
             <a:endParaRPr lang="en-US" dirty="0"/>
@@ -2437,35 +2437,35 @@
           <a:p>
             <a:pPr lvl="0"/>
             <a:r>
-              <a:rPr lang="en-US" smtClean="0"/>
+              <a:rPr lang="en-US"/>
               <a:t>Click to edit Master text styles</a:t>
             </a:r>
           </a:p>
           <a:p>
             <a:pPr lvl="1"/>
             <a:r>
-              <a:rPr lang="en-US" smtClean="0"/>
+              <a:rPr lang="en-US"/>
               <a:t>Second level</a:t>
             </a:r>
           </a:p>
           <a:p>
             <a:pPr lvl="2"/>
             <a:r>
-              <a:rPr lang="en-US" smtClean="0"/>
+              <a:rPr lang="en-US"/>
               <a:t>Third level</a:t>
             </a:r>
           </a:p>
           <a:p>
             <a:pPr lvl="3"/>
             <a:r>
-              <a:rPr lang="en-US" smtClean="0"/>
+              <a:rPr lang="en-US"/>
               <a:t>Fourth level</a:t>
             </a:r>
           </a:p>
           <a:p>
             <a:pPr lvl="4"/>
             <a:r>
-              <a:rPr lang="en-US" smtClean="0"/>
+              <a:rPr lang="en-US"/>
               <a:t>Fifth level</a:t>
             </a:r>
             <a:endParaRPr lang="en-US" dirty="0"/>
@@ -2531,7 +2531,7 @@
           <a:p>
             <a:pPr lvl="0"/>
             <a:r>
-              <a:rPr lang="en-US" smtClean="0"/>
+              <a:rPr lang="en-US"/>
               <a:t>Click to edit Master text styles</a:t>
             </a:r>
           </a:p>
@@ -2554,7 +2554,7 @@
           <a:p>
             <a:fld id="{8D0AC96A-CB4C-447A-BAE9-CD71E5D3E387}" type="datetime1">
               <a:rPr lang="nl-BE" smtClean="0"/>
-              <a:t>17/01/2018</a:t>
+              <a:t>28/01/2020</a:t>
             </a:fld>
             <a:endParaRPr lang="nl-BE"/>
           </a:p>
@@ -2657,7 +2657,7 @@
           </a:lstStyle>
           <a:p>
             <a:r>
-              <a:rPr lang="en-US" smtClean="0"/>
+              <a:rPr lang="en-US"/>
               <a:t>Click to edit Master title style</a:t>
             </a:r>
             <a:endParaRPr lang="en-US" dirty="0"/>
@@ -2722,7 +2722,7 @@
           </a:lstStyle>
           <a:p>
             <a:r>
-              <a:rPr lang="en-US" smtClean="0"/>
+              <a:rPr lang="en-US"/>
               <a:t>Click icon to add picture</a:t>
             </a:r>
             <a:endParaRPr lang="en-US" dirty="0"/>
@@ -2788,7 +2788,7 @@
           <a:p>
             <a:pPr lvl="0"/>
             <a:r>
-              <a:rPr lang="en-US" smtClean="0"/>
+              <a:rPr lang="en-US"/>
               <a:t>Click to edit Master text styles</a:t>
             </a:r>
           </a:p>
@@ -2811,7 +2811,7 @@
           <a:p>
             <a:fld id="{8EF713C0-6057-4AAB-80ED-C8B012F691C2}" type="datetime1">
               <a:rPr lang="nl-BE" smtClean="0"/>
-              <a:t>17/01/2018</a:t>
+              <a:t>28/01/2020</a:t>
             </a:fld>
             <a:endParaRPr lang="nl-BE"/>
           </a:p>
@@ -2920,7 +2920,7 @@
           <a:lstStyle/>
           <a:p>
             <a:r>
-              <a:rPr lang="en-US" smtClean="0"/>
+              <a:rPr lang="en-US"/>
               <a:t>Click to edit Master title style</a:t>
             </a:r>
             <a:endParaRPr lang="en-US" dirty="0"/>
@@ -2954,35 +2954,35 @@
           <a:p>
             <a:pPr lvl="0"/>
             <a:r>
-              <a:rPr lang="en-US" smtClean="0"/>
+              <a:rPr lang="en-US"/>
               <a:t>Click to edit Master text styles</a:t>
             </a:r>
           </a:p>
           <a:p>
             <a:pPr lvl="1"/>
             <a:r>
-              <a:rPr lang="en-US" smtClean="0"/>
+              <a:rPr lang="en-US"/>
               <a:t>Second level</a:t>
             </a:r>
           </a:p>
           <a:p>
             <a:pPr lvl="2"/>
             <a:r>
-              <a:rPr lang="en-US" smtClean="0"/>
+              <a:rPr lang="en-US"/>
               <a:t>Third level</a:t>
             </a:r>
           </a:p>
           <a:p>
             <a:pPr lvl="3"/>
             <a:r>
-              <a:rPr lang="en-US" smtClean="0"/>
+              <a:rPr lang="en-US"/>
               <a:t>Fourth level</a:t>
             </a:r>
           </a:p>
           <a:p>
             <a:pPr lvl="4"/>
             <a:r>
-              <a:rPr lang="en-US" smtClean="0"/>
+              <a:rPr lang="en-US"/>
               <a:t>Fifth level</a:t>
             </a:r>
             <a:endParaRPr lang="en-US" dirty="0"/>
@@ -3024,7 +3024,7 @@
           <a:p>
             <a:fld id="{67CEDA06-6E27-4D36-9084-23ECECD0BA0D}" type="datetime1">
               <a:rPr lang="nl-BE" smtClean="0"/>
-              <a:t>17/01/2018</a:t>
+              <a:t>28/01/2020</a:t>
             </a:fld>
             <a:endParaRPr lang="nl-BE"/>
           </a:p>
@@ -3446,19 +3446,15 @@
           <a:lstStyle/>
           <a:p>
             <a:r>
-              <a:rPr lang="en-US" dirty="0" smtClean="0"/>
+              <a:rPr lang="en-US" dirty="0"/>
               <a:t>Profiling with</a:t>
             </a:r>
             <a:br>
-              <a:rPr lang="en-US" dirty="0" smtClean="0"/>
+              <a:rPr lang="en-US" dirty="0"/>
             </a:br>
             <a:r>
-              <a:rPr lang="en-US" dirty="0" err="1" smtClean="0"/>
-              <a:t>Allinea</a:t>
-            </a:r>
-            <a:r>
-              <a:rPr lang="en-US" dirty="0" smtClean="0"/>
-              <a:t> MAP</a:t>
+              <a:rPr lang="en-US" dirty="0"/>
+              <a:t>Arm MAP</a:t>
             </a:r>
             <a:endParaRPr lang="nl-BE" dirty="0"/>
           </a:p>
@@ -3480,77 +3476,24 @@
           <a:lstStyle/>
           <a:p>
             <a:r>
-              <a:rPr lang="en-US" dirty="0" smtClean="0"/>
+              <a:rPr lang="en-US" dirty="0"/>
               <a:t>Geert Jan Bex</a:t>
             </a:r>
           </a:p>
           <a:p>
             <a:r>
-              <a:rPr lang="en-US" dirty="0" smtClean="0"/>
+              <a:rPr lang="en-US" dirty="0"/>
               <a:t>(</a:t>
             </a:r>
             <a:r>
-              <a:rPr lang="en-US" dirty="0" smtClean="0">
+              <a:rPr lang="en-US" dirty="0">
                 <a:hlinkClick r:id="rId3"/>
               </a:rPr>
               <a:t>geertjan.bex@uhasselt.be</a:t>
             </a:r>
             <a:r>
-              <a:rPr lang="en-US" dirty="0" smtClean="0"/>
+              <a:rPr lang="en-US" dirty="0"/>
               <a:t>) </a:t>
-            </a:r>
-            <a:endParaRPr lang="nl-BE" dirty="0"/>
-          </a:p>
-        </p:txBody>
-      </p:sp>
-      <p:sp>
-        <p:nvSpPr>
-          <p:cNvPr id="4" name="TextBox 3"/>
-          <p:cNvSpPr txBox="1"/>
-          <p:nvPr/>
-        </p:nvSpPr>
-        <p:spPr>
-          <a:xfrm>
-            <a:off x="1775204" y="5445224"/>
-            <a:ext cx="6869573" cy="646331"/>
-          </a:xfrm>
-          <a:prstGeom prst="rect">
-            <a:avLst/>
-          </a:prstGeom>
-          <a:noFill/>
-        </p:spPr>
-        <p:txBody>
-          <a:bodyPr wrap="none" rtlCol="0">
-            <a:spAutoFit/>
-          </a:bodyPr>
-          <a:lstStyle/>
-          <a:p>
-            <a:r>
-              <a:rPr lang="en-US" b="1" dirty="0" smtClean="0"/>
-              <a:t>License</a:t>
-            </a:r>
-            <a:r>
-              <a:rPr lang="en-US" dirty="0" smtClean="0"/>
-              <a:t>: this presentation is released under the Creative Commons, see</a:t>
-            </a:r>
-            <a:br>
-              <a:rPr lang="en-US" dirty="0" smtClean="0"/>
-            </a:br>
-            <a:r>
-              <a:rPr lang="nl-BE" dirty="0">
-                <a:hlinkClick r:id="rId4"/>
-              </a:rPr>
-              <a:t>http://creativecommons.org/publicdomain/zero/1.0</a:t>
-            </a:r>
-            <a:r>
-              <a:rPr lang="nl-BE" dirty="0" smtClean="0">
-                <a:hlinkClick r:id="rId4"/>
-              </a:rPr>
-              <a:t>/</a:t>
-            </a:r>
-            <a:r>
-              <a:rPr lang="nl-BE" dirty="0" smtClean="0"/>
-              <a:t> </a:t>
             </a:r>
             <a:endParaRPr lang="nl-BE" dirty="0"/>
           </a:p>
@@ -3579,6 +3522,59 @@
           </a:p>
         </p:txBody>
       </p:sp>
+      <p:sp>
+        <p:nvSpPr>
+          <p:cNvPr id="6" name="TextBox 5">
+            <a:extLst>
+              <a:ext uri="{FF2B5EF4-FFF2-40B4-BE49-F238E27FC236}">
+                <a16:creationId xmlns:a16="http://schemas.microsoft.com/office/drawing/2014/main" id="{98751FD9-9ABB-4E83-BF81-B3812F267163}"/>
+              </a:ext>
+            </a:extLst>
+          </p:cNvPr>
+          <p:cNvSpPr txBox="1"/>
+          <p:nvPr/>
+        </p:nvSpPr>
+        <p:spPr>
+          <a:xfrm>
+            <a:off x="1475656" y="5734997"/>
+            <a:ext cx="7424212" cy="646331"/>
+          </a:xfrm>
+          <a:prstGeom prst="rect">
+            <a:avLst/>
+          </a:prstGeom>
+          <a:noFill/>
+        </p:spPr>
+        <p:txBody>
+          <a:bodyPr wrap="none" rtlCol="0">
+            <a:spAutoFit/>
+          </a:bodyPr>
+          <a:lstStyle/>
+          <a:p>
+            <a:r>
+              <a:rPr lang="en-US" b="1" dirty="0"/>
+              <a:t>License</a:t>
+            </a:r>
+            <a:r>
+              <a:rPr lang="en-US" dirty="0"/>
+              <a:t>: this presentation is released under the Creative Commons CC BY 4.0,</a:t>
+            </a:r>
+            <a:br>
+              <a:rPr lang="en-US" dirty="0"/>
+            </a:br>
+            <a:r>
+              <a:rPr lang="en-US" dirty="0"/>
+              <a:t>see </a:t>
+            </a:r>
+            <a:r>
+              <a:rPr lang="en-US" dirty="0">
+                <a:hlinkClick r:id="rId4"/>
+              </a:rPr>
+              <a:t>https://creativecommons.org/licenses/by/4.0/deed.ast</a:t>
+            </a:r>
+            <a:endParaRPr lang="nl-BE" dirty="0"/>
+          </a:p>
+        </p:txBody>
+      </p:sp>
     </p:spTree>
     <p:extLst>
       <p:ext uri="{BB962C8B-B14F-4D97-AF65-F5344CB8AC3E}">
@@ -3589,13 +3585,6 @@
   <p:clrMapOvr>
     <a:masterClrMapping/>
   </p:clrMapOvr>
-  <p:timing>
-    <p:tnLst>
-      <p:par>
-        <p:cTn id="1" dur="indefinite" restart="never" nodeType="tmRoot"/>
-      </p:par>
-    </p:tnLst>
-  </p:timing>
 </p:sld>
 </file>
 
@@ -3632,7 +3621,7 @@
           <a:lstStyle/>
           <a:p>
             <a:r>
-              <a:rPr lang="en-US" dirty="0" smtClean="0"/>
+              <a:rPr lang="en-US" dirty="0"/>
               <a:t>Interactive profiling</a:t>
             </a:r>
             <a:endParaRPr lang="nl-BE" dirty="0"/>
@@ -3657,7 +3646,7 @@
           <a:lstStyle/>
           <a:p>
             <a:r>
-              <a:rPr lang="en-US" dirty="0" smtClean="0"/>
+              <a:rPr lang="en-US" dirty="0"/>
               <a:t>Run configuration</a:t>
             </a:r>
           </a:p>
@@ -3665,33 +3654,33 @@
             <a:endParaRPr lang="en-US" dirty="0"/>
           </a:p>
           <a:p>
-            <a:endParaRPr lang="en-US" dirty="0" smtClean="0"/>
-          </a:p>
-          <a:p>
             <a:endParaRPr lang="en-US" dirty="0"/>
           </a:p>
           <a:p>
-            <a:endParaRPr lang="en-US" dirty="0" smtClean="0"/>
-          </a:p>
-          <a:p>
             <a:endParaRPr lang="en-US" dirty="0"/>
           </a:p>
           <a:p>
-            <a:endParaRPr lang="en-US" dirty="0" smtClean="0"/>
-          </a:p>
-          <a:p>
             <a:endParaRPr lang="en-US" dirty="0"/>
           </a:p>
           <a:p>
-            <a:r>
-              <a:rPr lang="en-US" dirty="0" smtClean="0"/>
+            <a:endParaRPr lang="en-US" dirty="0"/>
+          </a:p>
+          <a:p>
+            <a:endParaRPr lang="en-US" dirty="0"/>
+          </a:p>
+          <a:p>
+            <a:endParaRPr lang="en-US" dirty="0"/>
+          </a:p>
+          <a:p>
+            <a:r>
+              <a:rPr lang="en-US" dirty="0"/>
               <a:t>Remembers</a:t>
             </a:r>
             <a:br>
-              <a:rPr lang="en-US" dirty="0" smtClean="0"/>
+              <a:rPr lang="en-US" dirty="0"/>
             </a:br>
             <a:r>
-              <a:rPr lang="en-US" dirty="0" smtClean="0"/>
+              <a:rPr lang="en-US" dirty="0"/>
               <a:t>between runs</a:t>
             </a:r>
             <a:endParaRPr lang="nl-BE" dirty="0"/>
@@ -3788,7 +3777,7 @@
             <a:lstStyle/>
             <a:p>
               <a:r>
-                <a:rPr lang="en-US" dirty="0" smtClean="0"/>
+                <a:rPr lang="en-US" dirty="0"/>
                 <a:t>Choose application</a:t>
               </a:r>
               <a:endParaRPr lang="nl-BE" dirty="0"/>
@@ -3871,7 +3860,7 @@
             <a:lstStyle/>
             <a:p>
               <a:r>
-                <a:rPr lang="en-US" dirty="0" smtClean="0"/>
+                <a:rPr lang="en-US" dirty="0"/>
                 <a:t>Application arguments</a:t>
               </a:r>
               <a:endParaRPr lang="nl-BE" dirty="0"/>
@@ -3954,7 +3943,7 @@
             <a:lstStyle/>
             <a:p>
               <a:r>
-                <a:rPr lang="en-US" dirty="0" smtClean="0"/>
+                <a:rPr lang="en-US" dirty="0"/>
                 <a:t>Working directory</a:t>
               </a:r>
               <a:endParaRPr lang="nl-BE" dirty="0"/>
@@ -4037,11 +4026,11 @@
             <a:lstStyle/>
             <a:p>
               <a:r>
-                <a:rPr lang="en-US" dirty="0" smtClean="0"/>
+                <a:rPr lang="en-US" dirty="0"/>
                 <a:t>Configure MPI/</a:t>
               </a:r>
               <a:r>
-                <a:rPr lang="en-US" dirty="0" err="1" smtClean="0"/>
+                <a:rPr lang="en-US" dirty="0" err="1"/>
                 <a:t>OpenMP</a:t>
               </a:r>
               <a:endParaRPr lang="nl-BE" dirty="0"/>
@@ -4163,7 +4152,7 @@
             <a:lstStyle/>
             <a:p>
               <a:r>
-                <a:rPr lang="en-US" dirty="0" smtClean="0"/>
+                <a:rPr lang="en-US" dirty="0"/>
                 <a:t>Start run/profiling</a:t>
               </a:r>
               <a:endParaRPr lang="nl-BE" dirty="0"/>
@@ -4614,7 +4603,7 @@
           <a:lstStyle/>
           <a:p>
             <a:r>
-              <a:rPr lang="en-US" dirty="0" smtClean="0"/>
+              <a:rPr lang="en-US" dirty="0"/>
               <a:t>Results</a:t>
             </a:r>
             <a:endParaRPr lang="nl-BE" dirty="0"/>
@@ -4711,7 +4700,7 @@
             <a:lstStyle/>
             <a:p>
               <a:r>
-                <a:rPr lang="en-US" sz="2800" b="1" dirty="0" smtClean="0">
+                <a:rPr lang="en-US" sz="2800" b="1" dirty="0">
                   <a:solidFill>
                     <a:srgbClr val="FF0000"/>
                   </a:solidFill>
@@ -4889,7 +4878,7 @@
           <a:lstStyle/>
           <a:p>
             <a:r>
-              <a:rPr lang="en-US" dirty="0" smtClean="0"/>
+              <a:rPr lang="en-US" dirty="0"/>
               <a:t>Line breakdown</a:t>
             </a:r>
             <a:endParaRPr lang="nl-BE" dirty="0"/>
@@ -5029,7 +5018,7 @@
             <a:lstStyle/>
             <a:p>
               <a:r>
-                <a:rPr lang="en-US" dirty="0" smtClean="0">
+                <a:rPr lang="en-US" dirty="0">
                   <a:solidFill>
                     <a:srgbClr val="00B050"/>
                   </a:solidFill>
@@ -5211,7 +5200,7 @@
             <a:lstStyle/>
             <a:p>
               <a:r>
-                <a:rPr lang="en-US" dirty="0" smtClean="0">
+                <a:rPr lang="en-US" dirty="0">
                   <a:solidFill>
                     <a:srgbClr val="00B050"/>
                   </a:solidFill>
@@ -5393,7 +5382,7 @@
             <a:lstStyle/>
             <a:p>
               <a:r>
-                <a:rPr lang="en-US" dirty="0" smtClean="0">
+                <a:rPr lang="en-US" dirty="0">
                   <a:solidFill>
                     <a:srgbClr val="C00000"/>
                   </a:solidFill>
@@ -5781,7 +5770,7 @@
           <a:lstStyle/>
           <a:p>
             <a:r>
-              <a:rPr lang="en-US" dirty="0" smtClean="0"/>
+              <a:rPr lang="en-US" dirty="0"/>
               <a:t>Time line</a:t>
             </a:r>
             <a:endParaRPr lang="nl-BE" dirty="0"/>
@@ -5811,57 +5800,49 @@
           <a:lstStyle/>
           <a:p>
             <a:r>
-              <a:rPr lang="en-US" dirty="0" smtClean="0"/>
+              <a:rPr lang="en-US" dirty="0"/>
               <a:t>Can display many metrics</a:t>
             </a:r>
           </a:p>
           <a:p>
             <a:pPr lvl="1"/>
             <a:r>
-              <a:rPr lang="en-US" dirty="0" smtClean="0"/>
+              <a:rPr lang="en-US" dirty="0"/>
               <a:t>CPU instructions</a:t>
             </a:r>
           </a:p>
           <a:p>
             <a:pPr lvl="1"/>
             <a:r>
-              <a:rPr lang="en-US" dirty="0" smtClean="0"/>
+              <a:rPr lang="en-US" dirty="0"/>
               <a:t>I/O: disk read/write</a:t>
             </a:r>
           </a:p>
           <a:p>
             <a:pPr lvl="1"/>
             <a:r>
-              <a:rPr lang="en-US" dirty="0" smtClean="0"/>
+              <a:rPr lang="en-US" dirty="0"/>
               <a:t>MPI</a:t>
             </a:r>
           </a:p>
           <a:p>
             <a:pPr lvl="2"/>
             <a:r>
-              <a:rPr lang="en-US" dirty="0" smtClean="0"/>
-              <a:t>Number </a:t>
-            </a:r>
-            <a:r>
               <a:rPr lang="en-US" dirty="0"/>
-              <a:t>c</a:t>
-            </a:r>
-            <a:r>
-              <a:rPr lang="en-US" dirty="0" smtClean="0"/>
-              <a:t>alls peer-to-peer &amp; collectives/s</a:t>
+              <a:t>Number calls peer-to-peer &amp; collectives/s</a:t>
             </a:r>
           </a:p>
           <a:p>
             <a:pPr lvl="2"/>
             <a:r>
-              <a:rPr lang="en-US" dirty="0" smtClean="0"/>
+              <a:rPr lang="en-US" dirty="0"/>
               <a:t>Peer-to-peer &amp; collectives bandwidth</a:t>
             </a:r>
           </a:p>
           <a:p>
             <a:pPr lvl="2"/>
             <a:r>
-              <a:rPr lang="en-US" dirty="0" smtClean="0"/>
+              <a:rPr lang="en-US" dirty="0"/>
               <a:t>Send &amp; receive bandwidth</a:t>
             </a:r>
             <a:endParaRPr lang="nl-BE" dirty="0"/>
@@ -5988,7 +5969,7 @@
             <a:lstStyle/>
             <a:p>
               <a:r>
-                <a:rPr lang="en-US" dirty="0" smtClean="0"/>
+                <a:rPr lang="en-US" dirty="0"/>
                 <a:t>time</a:t>
               </a:r>
               <a:endParaRPr lang="nl-BE" dirty="0"/>
@@ -6069,7 +6050,7 @@
             <a:lstStyle/>
             <a:p>
               <a:r>
-                <a:rPr lang="en-US" dirty="0" smtClean="0"/>
+                <a:rPr lang="en-US" dirty="0"/>
                 <a:t>processes</a:t>
               </a:r>
               <a:endParaRPr lang="nl-BE" dirty="0"/>
@@ -6105,7 +6086,7 @@
           <a:lstStyle/>
           <a:p>
             <a:r>
-              <a:rPr lang="en-US" sz="2000" dirty="0" smtClean="0"/>
+              <a:rPr lang="en-US" sz="2000" dirty="0"/>
               <a:t>Any combination</a:t>
             </a:r>
             <a:endParaRPr lang="nl-BE" sz="2000" dirty="0"/>
@@ -6361,7 +6342,7 @@
               <a:lstStyle/>
               <a:p>
                 <a:r>
-                  <a:rPr lang="en-US" dirty="0" smtClean="0"/>
+                  <a:rPr lang="en-US" dirty="0"/>
                   <a:t>Zoom by selecting</a:t>
                 </a:r>
                 <a:endParaRPr lang="nl-BE" dirty="0"/>
@@ -6480,20 +6461,20 @@
           <a:lstStyle/>
           <a:p>
             <a:r>
-              <a:rPr lang="en-US" sz="2400" dirty="0" smtClean="0"/>
+              <a:rPr lang="en-US" sz="2400" dirty="0"/>
               <a:t>Very useful to</a:t>
             </a:r>
             <a:br>
-              <a:rPr lang="en-US" sz="2400" dirty="0" smtClean="0"/>
+              <a:rPr lang="en-US" sz="2400" dirty="0"/>
             </a:br>
             <a:r>
-              <a:rPr lang="en-US" sz="2400" dirty="0" smtClean="0"/>
+              <a:rPr lang="en-US" sz="2400" dirty="0"/>
               <a:t>identify run</a:t>
             </a:r>
           </a:p>
           <a:p>
             <a:r>
-              <a:rPr lang="en-US" sz="2400" dirty="0" smtClean="0"/>
+              <a:rPr lang="en-US" sz="2400" dirty="0"/>
               <a:t>phases</a:t>
             </a:r>
             <a:endParaRPr lang="nl-BE" sz="2400" dirty="0"/>
@@ -6537,7 +6518,7 @@
             <a:lstStyle/>
             <a:p>
               <a:r>
-                <a:rPr lang="en-US" dirty="0" smtClean="0"/>
+                <a:rPr lang="en-US" dirty="0"/>
                 <a:t>All view updated!</a:t>
               </a:r>
               <a:endParaRPr lang="nl-BE" dirty="0"/>
@@ -6619,25 +6600,17 @@
             <a:p>
               <a:r>
                 <a:rPr lang="en-US" dirty="0"/>
-                <a:t>m</a:t>
+                <a:t>min, max, mean, </a:t>
               </a:r>
               <a:r>
-                <a:rPr lang="en-US" dirty="0" smtClean="0"/>
-                <a:t>in, max, mean, </a:t>
-              </a:r>
-              <a:r>
-                <a:rPr lang="en-US" dirty="0" err="1" smtClean="0"/>
+                <a:rPr lang="en-US" dirty="0" err="1"/>
                 <a:t>s.d.</a:t>
               </a:r>
-              <a:r>
-                <a:rPr lang="en-US" dirty="0" smtClean="0"/>
-                <a:t/>
-              </a:r>
               <a:br>
-                <a:rPr lang="en-US" dirty="0" smtClean="0"/>
+                <a:rPr lang="en-US" dirty="0"/>
               </a:br>
               <a:r>
-                <a:rPr lang="en-US" dirty="0" smtClean="0"/>
+                <a:rPr lang="en-US" dirty="0"/>
                 <a:t>available</a:t>
               </a:r>
               <a:endParaRPr lang="nl-BE" dirty="0"/>
@@ -7278,7 +7251,7 @@
           <a:lstStyle/>
           <a:p>
             <a:r>
-              <a:rPr lang="en-US" dirty="0" smtClean="0"/>
+              <a:rPr lang="en-US" dirty="0"/>
               <a:t>Source code view</a:t>
             </a:r>
             <a:endParaRPr lang="nl-BE" dirty="0"/>
@@ -7303,29 +7276,29 @@
         </p:spPr>
         <p:txBody>
           <a:bodyPr>
-            <a:normAutofit fontScale="92500" lnSpcReduction="10000"/>
+            <a:normAutofit fontScale="92500" lnSpcReduction="20000"/>
           </a:bodyPr>
           <a:lstStyle/>
           <a:p>
             <a:r>
-              <a:rPr lang="en-US" dirty="0" smtClean="0"/>
+              <a:rPr lang="en-US" dirty="0"/>
               <a:t>Easy to navigate through code</a:t>
             </a:r>
           </a:p>
           <a:p>
             <a:pPr lvl="1"/>
             <a:r>
-              <a:rPr lang="en-US" dirty="0" smtClean="0"/>
+              <a:rPr lang="en-US" dirty="0"/>
               <a:t>Go to function definitions in any file</a:t>
             </a:r>
           </a:p>
           <a:p>
             <a:r>
-              <a:rPr lang="en-US" dirty="0" smtClean="0"/>
+              <a:rPr lang="en-US" dirty="0"/>
               <a:t>Requires compile with </a:t>
             </a:r>
             <a:r>
-              <a:rPr lang="en-US" dirty="0" smtClean="0">
+              <a:rPr lang="en-US" dirty="0">
                 <a:latin typeface="Courier New" panose="02070309020205020404" pitchFamily="49" charset="0"/>
                 <a:cs typeface="Courier New" panose="02070309020205020404" pitchFamily="49" charset="0"/>
               </a:rPr>
@@ -7421,14 +7394,14 @@
             <a:lstStyle/>
             <a:p>
               <a:r>
-                <a:rPr lang="en-US" dirty="0" smtClean="0"/>
+                <a:rPr lang="en-US" dirty="0"/>
                 <a:t>Line based</a:t>
               </a:r>
               <a:br>
-                <a:rPr lang="en-US" dirty="0" smtClean="0"/>
+                <a:rPr lang="en-US" dirty="0"/>
               </a:br>
               <a:r>
-                <a:rPr lang="en-US" dirty="0" smtClean="0"/>
+                <a:rPr lang="en-US" dirty="0"/>
                 <a:t>activity</a:t>
               </a:r>
               <a:endParaRPr lang="nl-BE" dirty="0"/>
@@ -7514,23 +7487,23 @@
             <a:lstStyle/>
             <a:p>
               <a:r>
-                <a:rPr lang="en-US" dirty="0" smtClean="0"/>
+                <a:rPr lang="en-US" dirty="0"/>
                 <a:t>Color coded:</a:t>
               </a:r>
             </a:p>
             <a:p>
               <a:r>
-                <a:rPr lang="en-US" dirty="0" smtClean="0"/>
+                <a:rPr lang="en-US" dirty="0"/>
                 <a:t> </a:t>
               </a:r>
               <a:r>
-                <a:rPr lang="en-US" dirty="0" smtClean="0">
+                <a:rPr lang="en-US" dirty="0">
                   <a:sym typeface="Symbol" panose="05050102010706020507" pitchFamily="18" charset="2"/>
                 </a:rPr>
                 <a:t> </a:t>
               </a:r>
               <a:r>
-                <a:rPr lang="en-US" dirty="0" smtClean="0">
+                <a:rPr lang="en-US" dirty="0">
                   <a:solidFill>
                     <a:srgbClr val="0070C0"/>
                   </a:solidFill>
@@ -7555,7 +7528,7 @@
                 <a:t> </a:t>
               </a:r>
               <a:r>
-                <a:rPr lang="en-US" dirty="0" smtClean="0">
+                <a:rPr lang="en-US" dirty="0">
                   <a:solidFill>
                     <a:srgbClr val="00B050"/>
                   </a:solidFill>
@@ -7675,7 +7648,7 @@
             <a:lstStyle/>
             <a:p>
               <a:r>
-                <a:rPr lang="en-US" dirty="0" smtClean="0"/>
+                <a:rPr lang="en-US" dirty="0"/>
                 <a:t>Code can be folded</a:t>
               </a:r>
               <a:endParaRPr lang="nl-BE" dirty="0"/>
@@ -8064,7 +8037,7 @@
           <a:lstStyle/>
           <a:p>
             <a:r>
-              <a:rPr lang="en-US" dirty="0" smtClean="0"/>
+              <a:rPr lang="en-US" dirty="0"/>
               <a:t>Call stack view</a:t>
             </a:r>
             <a:endParaRPr lang="nl-BE" dirty="0"/>
@@ -8115,13 +8088,13 @@
           <a:lstStyle/>
           <a:p>
             <a:r>
-              <a:rPr lang="en-US" dirty="0" smtClean="0"/>
+              <a:rPr lang="en-US" dirty="0"/>
               <a:t>Ordered by % runtime</a:t>
             </a:r>
           </a:p>
           <a:p>
             <a:r>
-              <a:rPr lang="en-US" dirty="0" smtClean="0"/>
+              <a:rPr lang="en-US" dirty="0"/>
               <a:t>Navigate to source code</a:t>
             </a:r>
             <a:endParaRPr lang="nl-BE" dirty="0"/>
@@ -8189,7 +8162,7 @@
             <a:lstStyle/>
             <a:p>
               <a:r>
-                <a:rPr lang="en-US" dirty="0" smtClean="0"/>
+                <a:rPr lang="en-US" dirty="0"/>
                 <a:t>Click to go to code</a:t>
               </a:r>
               <a:endParaRPr lang="nl-BE" dirty="0"/>
@@ -8442,7 +8415,7 @@
           <a:lstStyle/>
           <a:p>
             <a:r>
-              <a:rPr lang="en-US" dirty="0" smtClean="0"/>
+              <a:rPr lang="en-US" dirty="0"/>
               <a:t>Round tripping</a:t>
             </a:r>
             <a:endParaRPr lang="nl-BE" dirty="0"/>
@@ -8465,49 +8438,41 @@
           <a:lstStyle/>
           <a:p>
             <a:r>
-              <a:rPr lang="en-US" dirty="0" smtClean="0"/>
-              <a:t>From within </a:t>
-            </a:r>
-            <a:r>
-              <a:rPr lang="en-US" dirty="0" err="1" smtClean="0"/>
-              <a:t>Allinea</a:t>
-            </a:r>
-            <a:r>
-              <a:rPr lang="en-US" dirty="0" smtClean="0"/>
-              <a:t> MAP</a:t>
+              <a:rPr lang="en-US" dirty="0"/>
+              <a:t>From within Allinea MAP</a:t>
             </a:r>
           </a:p>
           <a:p>
             <a:pPr lvl="1"/>
             <a:r>
-              <a:rPr lang="en-US" dirty="0" smtClean="0"/>
+              <a:rPr lang="en-US" dirty="0"/>
               <a:t>Edit code</a:t>
             </a:r>
           </a:p>
           <a:p>
             <a:pPr lvl="1"/>
             <a:r>
-              <a:rPr lang="en-US" dirty="0" smtClean="0"/>
+              <a:rPr lang="en-US" dirty="0"/>
               <a:t>Rebuild</a:t>
             </a:r>
           </a:p>
           <a:p>
             <a:pPr lvl="1"/>
             <a:r>
-              <a:rPr lang="en-US" dirty="0" smtClean="0"/>
+              <a:rPr lang="en-US" dirty="0"/>
               <a:t>Profile</a:t>
             </a:r>
           </a:p>
           <a:p>
             <a:pPr lvl="1"/>
             <a:r>
-              <a:rPr lang="en-US" dirty="0" smtClean="0"/>
+              <a:rPr lang="en-US" dirty="0"/>
               <a:t>Commit in version control system</a:t>
             </a:r>
           </a:p>
           <a:p>
             <a:r>
-              <a:rPr lang="en-US" dirty="0" smtClean="0"/>
+              <a:rPr lang="en-US" dirty="0"/>
               <a:t>Switch between MAP and DDT</a:t>
             </a:r>
             <a:endParaRPr lang="nl-BE" dirty="0"/>
@@ -8841,7 +8806,7 @@
           <a:lstStyle/>
           <a:p>
             <a:r>
-              <a:rPr lang="en-US" dirty="0" smtClean="0"/>
+              <a:rPr lang="en-US" dirty="0"/>
               <a:t>Interactive profiling via job</a:t>
             </a:r>
             <a:endParaRPr lang="nl-BE" dirty="0"/>
@@ -8941,36 +8906,28 @@
           <a:lstStyle/>
           <a:p>
             <a:r>
-              <a:rPr lang="en-US" dirty="0" smtClean="0"/>
+              <a:rPr lang="en-US" dirty="0"/>
               <a:t>Job will run</a:t>
             </a:r>
-            <a:r>
-              <a:rPr lang="nl-BE" dirty="0" smtClean="0"/>
-              <a:t/>
-            </a:r>
             <a:br>
-              <a:rPr lang="nl-BE" dirty="0" smtClean="0"/>
+              <a:rPr lang="nl-BE" dirty="0"/>
             </a:br>
             <a:r>
-              <a:rPr lang="nl-BE" dirty="0" smtClean="0"/>
+              <a:rPr lang="nl-BE" dirty="0"/>
               <a:t>on </a:t>
             </a:r>
             <a:r>
-              <a:rPr lang="nl-BE" dirty="0" err="1" smtClean="0"/>
+              <a:rPr lang="nl-BE" dirty="0" err="1"/>
               <a:t>compute</a:t>
             </a:r>
-            <a:r>
-              <a:rPr lang="nl-BE" dirty="0" smtClean="0"/>
-              <a:t/>
-            </a:r>
             <a:br>
-              <a:rPr lang="nl-BE" dirty="0" smtClean="0"/>
+              <a:rPr lang="nl-BE" dirty="0"/>
             </a:br>
             <a:r>
-              <a:rPr lang="nl-BE" dirty="0" err="1" smtClean="0"/>
+              <a:rPr lang="nl-BE" dirty="0" err="1"/>
               <a:t>nodes</a:t>
             </a:r>
-            <a:endParaRPr lang="en-US" dirty="0" smtClean="0"/>
+            <a:endParaRPr lang="en-US" dirty="0"/>
           </a:p>
         </p:txBody>
       </p:sp>
@@ -9098,7 +9055,7 @@
           <a:lstStyle/>
           <a:p>
             <a:r>
-              <a:rPr lang="en-US" dirty="0" smtClean="0"/>
+              <a:rPr lang="en-US" dirty="0"/>
               <a:t>Batch profiling via job</a:t>
             </a:r>
             <a:endParaRPr lang="nl-BE" dirty="0"/>
@@ -9126,13 +9083,13 @@
           <a:lstStyle/>
           <a:p>
             <a:r>
-              <a:rPr lang="en-US" dirty="0" smtClean="0"/>
+              <a:rPr lang="en-US" dirty="0"/>
               <a:t>Submit job</a:t>
             </a:r>
           </a:p>
           <a:p>
             <a:r>
-              <a:rPr lang="en-US" dirty="0" smtClean="0"/>
+              <a:rPr lang="en-US" dirty="0"/>
               <a:t>When done, open profile with MAP</a:t>
             </a:r>
             <a:endParaRPr lang="nl-BE" dirty="0"/>
@@ -9194,7 +9151,7 @@
           <a:lstStyle/>
           <a:p>
             <a:r>
-              <a:rPr lang="en-US" dirty="0" smtClean="0">
+              <a:rPr lang="en-US" dirty="0">
                 <a:latin typeface="Courier New" panose="02070309020205020404" pitchFamily="49" charset="0"/>
                 <a:cs typeface="Courier New" panose="02070309020205020404" pitchFamily="49" charset="0"/>
               </a:rPr>
@@ -9203,7 +9160,7 @@
           </a:p>
           <a:p>
             <a:r>
-              <a:rPr lang="en-US" dirty="0" smtClean="0">
+              <a:rPr lang="en-US" dirty="0">
                 <a:latin typeface="Courier New" panose="02070309020205020404" pitchFamily="49" charset="0"/>
                 <a:cs typeface="Courier New" panose="02070309020205020404" pitchFamily="49" charset="0"/>
               </a:rPr>
@@ -9212,21 +9169,21 @@
           </a:p>
           <a:p>
             <a:r>
-              <a:rPr lang="en-US" dirty="0" smtClean="0">
+              <a:rPr lang="en-US" dirty="0">
                 <a:latin typeface="Courier New" panose="02070309020205020404" pitchFamily="49" charset="0"/>
                 <a:cs typeface="Courier New" panose="02070309020205020404" pitchFamily="49" charset="0"/>
               </a:rPr>
               <a:t>#PBS –l </a:t>
             </a:r>
             <a:r>
-              <a:rPr lang="en-US" dirty="0" err="1" smtClean="0">
+              <a:rPr lang="en-US" dirty="0" err="1">
                 <a:latin typeface="Courier New" panose="02070309020205020404" pitchFamily="49" charset="0"/>
                 <a:cs typeface="Courier New" panose="02070309020205020404" pitchFamily="49" charset="0"/>
               </a:rPr>
               <a:t>walltime</a:t>
             </a:r>
             <a:r>
-              <a:rPr lang="en-US" dirty="0" smtClean="0">
+              <a:rPr lang="en-US" dirty="0">
                 <a:latin typeface="Courier New" panose="02070309020205020404" pitchFamily="49" charset="0"/>
                 <a:cs typeface="Courier New" panose="02070309020205020404" pitchFamily="49" charset="0"/>
               </a:rPr>
@@ -9235,7 +9192,7 @@
           </a:p>
           <a:p>
             <a:r>
-              <a:rPr lang="en-US" dirty="0" smtClean="0">
+              <a:rPr lang="en-US" dirty="0">
                 <a:latin typeface="Courier New" panose="02070309020205020404" pitchFamily="49" charset="0"/>
                 <a:cs typeface="Courier New" panose="02070309020205020404" pitchFamily="49" charset="0"/>
               </a:rPr>
@@ -9244,7 +9201,7 @@
           </a:p>
           <a:p>
             <a:r>
-              <a:rPr lang="en-US" dirty="0" smtClean="0">
+              <a:rPr lang="en-US" dirty="0">
                 <a:latin typeface="Courier New" panose="02070309020205020404" pitchFamily="49" charset="0"/>
                 <a:cs typeface="Courier New" panose="02070309020205020404" pitchFamily="49" charset="0"/>
               </a:rPr>
@@ -9257,14 +9214,7 @@
                 <a:latin typeface="Courier New" panose="02070309020205020404" pitchFamily="49" charset="0"/>
                 <a:cs typeface="Courier New" panose="02070309020205020404" pitchFamily="49" charset="0"/>
               </a:rPr>
-              <a:t> </a:t>
-            </a:r>
-            <a:r>
-              <a:rPr lang="en-US" dirty="0" smtClean="0">
-                <a:latin typeface="Courier New" panose="02070309020205020404" pitchFamily="49" charset="0"/>
-                <a:cs typeface="Courier New" panose="02070309020205020404" pitchFamily="49" charset="0"/>
-              </a:rPr>
-              <a:t>    diffusion.exe  10000 5000 30</a:t>
+              <a:t>     diffusion.exe  10000 5000 30</a:t>
             </a:r>
             <a:endParaRPr lang="nl-BE" dirty="0">
               <a:latin typeface="Courier New" panose="02070309020205020404" pitchFamily="49" charset="0"/>
@@ -9453,18 +9403,13 @@
           <a:lstStyle/>
           <a:p>
             <a:r>
-              <a:rPr lang="en-US" dirty="0" err="1" smtClean="0"/>
+              <a:rPr lang="en-US" dirty="0" err="1"/>
               <a:t>ommunication</a:t>
             </a:r>
             <a:r>
-              <a:rPr lang="en-US" dirty="0" smtClean="0"/>
-              <a:t> </a:t>
-            </a:r>
-            <a:r>
-              <a:rPr lang="en-US" dirty="0" smtClean="0"/>
-              <a:t>vs. computation</a:t>
-            </a:r>
-            <a:endParaRPr lang="en-US" dirty="0"/>
+              <a:rPr lang="en-US" dirty="0"/>
+              <a:t> vs. computation</a:t>
+            </a:r>
           </a:p>
         </p:txBody>
       </p:sp>
@@ -9520,13 +9465,6 @@
   <p:clrMapOvr>
     <a:masterClrMapping/>
   </p:clrMapOvr>
-  <p:timing>
-    <p:tnLst>
-      <p:par>
-        <p:cTn id="1" dur="indefinite" restart="never" nodeType="tmRoot"/>
-      </p:par>
-    </p:tnLst>
-  </p:timing>
 </p:sld>
 </file>
 
@@ -9563,7 +9501,7 @@
           <a:lstStyle/>
           <a:p>
             <a:r>
-              <a:rPr lang="en-US" dirty="0" smtClean="0"/>
+              <a:rPr lang="en-US" dirty="0"/>
               <a:t>Introduction</a:t>
             </a:r>
             <a:endParaRPr lang="nl-BE" dirty="0"/>
@@ -9622,13 +9560,6 @@
   <p:clrMapOvr>
     <a:masterClrMapping/>
   </p:clrMapOvr>
-  <p:timing>
-    <p:tnLst>
-      <p:par>
-        <p:cTn id="1" dur="indefinite" restart="never" nodeType="tmRoot"/>
-      </p:par>
-    </p:tnLst>
-  </p:timing>
 </p:sld>
 </file>
 
@@ -9665,10 +9596,9 @@
           <a:lstStyle/>
           <a:p>
             <a:r>
-              <a:rPr lang="en-US" dirty="0" smtClean="0"/>
+              <a:rPr lang="en-US" dirty="0"/>
               <a:t>Domain decomposition</a:t>
             </a:r>
-            <a:endParaRPr lang="en-US" dirty="0"/>
           </a:p>
         </p:txBody>
       </p:sp>
@@ -9844,7 +9774,7 @@
             <a:lstStyle/>
             <a:p>
               <a:r>
-                <a:rPr lang="en-US" dirty="0" err="1" smtClean="0">
+                <a:rPr lang="en-US" dirty="0" err="1">
                   <a:solidFill>
                     <a:srgbClr val="0070C0"/>
                   </a:solidFill>
@@ -9979,7 +9909,7 @@
             <a:lstStyle/>
             <a:p>
               <a:r>
-                <a:rPr lang="en-US" dirty="0" err="1" smtClean="0">
+                <a:rPr lang="en-US" dirty="0" err="1">
                   <a:solidFill>
                     <a:srgbClr val="0070C0"/>
                   </a:solidFill>
@@ -10114,18 +10044,13 @@
             <a:lstStyle/>
             <a:p>
               <a:r>
-                <a:rPr lang="en-US" dirty="0" smtClean="0">
+                <a:rPr lang="en-US" dirty="0">
                   <a:solidFill>
                     <a:srgbClr val="0070C0"/>
                   </a:solidFill>
                 </a:rPr>
                 <a:t>resources</a:t>
               </a:r>
-              <a:endParaRPr lang="en-US" dirty="0">
-                <a:solidFill>
-                  <a:srgbClr val="0070C0"/>
-                </a:solidFill>
-              </a:endParaRPr>
             </a:p>
           </p:txBody>
         </p:sp>
@@ -10249,18 +10174,13 @@
             <a:lstStyle/>
             <a:p>
               <a:r>
-                <a:rPr lang="en-US" dirty="0" smtClean="0">
+                <a:rPr lang="en-US" dirty="0">
                   <a:solidFill>
                     <a:srgbClr val="0070C0"/>
                   </a:solidFill>
                 </a:rPr>
                 <a:t>resources</a:t>
               </a:r>
-              <a:endParaRPr lang="en-US" dirty="0">
-                <a:solidFill>
-                  <a:srgbClr val="0070C0"/>
-                </a:solidFill>
-              </a:endParaRPr>
             </a:p>
           </p:txBody>
         </p:sp>
@@ -10432,21 +10352,8 @@
                     <a:srgbClr val="C00000"/>
                   </a:solidFill>
                 </a:rPr>
-                <a:t>l</a:t>
+                <a:t>lots of MPI chatter!</a:t>
               </a:r>
-              <a:r>
-                <a:rPr lang="en-US" dirty="0" smtClean="0">
-                  <a:solidFill>
-                    <a:srgbClr val="C00000"/>
-                  </a:solidFill>
-                </a:rPr>
-                <a:t>ots of MPI chatter!</a:t>
-              </a:r>
-              <a:endParaRPr lang="en-US" dirty="0">
-                <a:solidFill>
-                  <a:srgbClr val="C00000"/>
-                </a:solidFill>
-              </a:endParaRPr>
             </a:p>
           </p:txBody>
         </p:sp>
@@ -10578,18 +10485,13 @@
             <a:lstStyle/>
             <a:p>
               <a:r>
-                <a:rPr lang="en-US" dirty="0" smtClean="0">
+                <a:rPr lang="en-US" dirty="0">
                   <a:solidFill>
                     <a:srgbClr val="C00000"/>
                   </a:solidFill>
                 </a:rPr>
                 <a:t>load imbalance</a:t>
               </a:r>
-              <a:endParaRPr lang="en-US" dirty="0">
-                <a:solidFill>
-                  <a:srgbClr val="C00000"/>
-                </a:solidFill>
-              </a:endParaRPr>
             </a:p>
           </p:txBody>
         </p:sp>
@@ -10624,10 +10526,9 @@
           <a:lstStyle/>
           <a:p>
             <a:r>
-              <a:rPr lang="en-US" sz="2000" dirty="0" smtClean="0"/>
+              <a:rPr lang="en-US" sz="2000" dirty="0"/>
               <a:t>domains too small!</a:t>
             </a:r>
-            <a:endParaRPr lang="en-US" sz="2000" dirty="0"/>
           </a:p>
         </p:txBody>
       </p:sp>
@@ -11070,7 +10971,7 @@
           <a:lstStyle/>
           <a:p>
             <a:r>
-              <a:rPr lang="en-US" dirty="0" smtClean="0"/>
+              <a:rPr lang="en-US" dirty="0"/>
               <a:t>Conclusions</a:t>
             </a:r>
             <a:endParaRPr lang="nl-BE" dirty="0"/>
@@ -11129,13 +11030,6 @@
   <p:clrMapOvr>
     <a:masterClrMapping/>
   </p:clrMapOvr>
-  <p:timing>
-    <p:tnLst>
-      <p:par>
-        <p:cTn id="1" dur="indefinite" restart="never" nodeType="tmRoot"/>
-      </p:par>
-    </p:tnLst>
-  </p:timing>
 </p:sld>
 </file>
 
@@ -11172,7 +11066,7 @@
           <a:lstStyle/>
           <a:p>
             <a:r>
-              <a:rPr lang="en-US" dirty="0" smtClean="0"/>
+              <a:rPr lang="en-US" dirty="0"/>
               <a:t>Conclusions</a:t>
             </a:r>
             <a:endParaRPr lang="nl-BE" dirty="0"/>
@@ -11197,73 +11091,65 @@
           <a:lstStyle/>
           <a:p>
             <a:r>
-              <a:rPr lang="en-US" dirty="0" smtClean="0"/>
-              <a:t>MAP is excellent for applications with </a:t>
-            </a:r>
-            <a:r>
               <a:rPr lang="en-US" dirty="0"/>
-              <a:t>many </a:t>
-            </a:r>
-            <a:r>
-              <a:rPr lang="en-US" dirty="0" smtClean="0"/>
-              <a:t>processes/threads</a:t>
+              <a:t>MAP is excellent for applications with many processes/threads</a:t>
             </a:r>
           </a:p>
           <a:p>
             <a:pPr lvl="1"/>
             <a:r>
-              <a:rPr lang="en-US" dirty="0" smtClean="0"/>
+              <a:rPr lang="en-US" dirty="0"/>
               <a:t>Easy to get an overview</a:t>
             </a:r>
           </a:p>
           <a:p>
             <a:r>
-              <a:rPr lang="en-US" dirty="0" smtClean="0"/>
+              <a:rPr lang="en-US" dirty="0"/>
               <a:t>However, works well for serial code too</a:t>
             </a:r>
           </a:p>
           <a:p>
             <a:r>
-              <a:rPr lang="en-US" dirty="0" smtClean="0"/>
+              <a:rPr lang="en-US" dirty="0"/>
               <a:t>Timeline is valuable tool</a:t>
             </a:r>
           </a:p>
           <a:p>
             <a:r>
-              <a:rPr lang="en-US" dirty="0" smtClean="0"/>
+              <a:rPr lang="en-US" dirty="0"/>
               <a:t>Very easy to use, but correct interpretation requires insight</a:t>
             </a:r>
           </a:p>
           <a:p>
             <a:r>
-              <a:rPr lang="en-US" dirty="0" smtClean="0"/>
+              <a:rPr lang="en-US" dirty="0"/>
               <a:t>Drawback: limited to number of tokens</a:t>
             </a:r>
           </a:p>
           <a:p>
             <a:pPr lvl="1"/>
             <a:r>
-              <a:rPr lang="en-US" dirty="0" smtClean="0"/>
+              <a:rPr lang="en-US" dirty="0"/>
               <a:t>Number of processes</a:t>
             </a:r>
           </a:p>
           <a:p>
             <a:pPr lvl="1"/>
             <a:r>
-              <a:rPr lang="en-US" dirty="0" smtClean="0"/>
+              <a:rPr lang="en-US" dirty="0"/>
               <a:t>Concurrent sessions</a:t>
             </a:r>
           </a:p>
           <a:p>
             <a:r>
-              <a:rPr lang="en-US" dirty="0" smtClean="0"/>
+              <a:rPr lang="en-US" dirty="0"/>
               <a:t>As any tool, not Swiss army knife</a:t>
             </a:r>
           </a:p>
           <a:p>
             <a:pPr lvl="1"/>
             <a:r>
-              <a:rPr lang="en-US" dirty="0" smtClean="0"/>
+              <a:rPr lang="en-US" dirty="0"/>
               <a:t>Use in combination with other tools, e.g., Intel</a:t>
             </a:r>
           </a:p>
@@ -11795,7 +11681,7 @@
           <a:lstStyle/>
           <a:p>
             <a:r>
-              <a:rPr lang="en-US" dirty="0" smtClean="0"/>
+              <a:rPr lang="en-US" dirty="0"/>
               <a:t>Introduction</a:t>
             </a:r>
             <a:endParaRPr lang="nl-BE" dirty="0"/>
@@ -11814,120 +11700,77 @@
         </p:nvSpPr>
         <p:spPr/>
         <p:txBody>
-          <a:bodyPr/>
+          <a:bodyPr>
+            <a:normAutofit/>
+          </a:bodyPr>
           <a:lstStyle/>
           <a:p>
             <a:r>
-              <a:rPr lang="en-US" dirty="0" err="1" smtClean="0"/>
-              <a:t>Allinea</a:t>
-            </a:r>
-            <a:r>
               <a:rPr lang="en-US" dirty="0"/>
-              <a:t> Forge (</a:t>
-            </a:r>
-            <a:r>
-              <a:rPr lang="en-US" dirty="0">
+              <a:t>Arm Forge </a:t>
+            </a:r>
+            <a:r>
+              <a:rPr lang="en-US" sz="1100" dirty="0"/>
+              <a:t>(</a:t>
+            </a:r>
+            <a:r>
+              <a:rPr lang="en-GB" sz="1100" dirty="0">
                 <a:hlinkClick r:id="rId2"/>
               </a:rPr>
-              <a:t>https://www.allinea.com</a:t>
-            </a:r>
-            <a:r>
-              <a:rPr lang="en-US" dirty="0" smtClean="0">
-                <a:hlinkClick r:id="rId2"/>
-              </a:rPr>
-              <a:t>/</a:t>
-            </a:r>
-            <a:r>
-              <a:rPr lang="en-US" dirty="0" smtClean="0"/>
+              <a:t>https://developer.arm.com/tools-and-software/server-and-hpc/debug-and-profile/arm-forge</a:t>
+            </a:r>
+            <a:r>
+              <a:rPr lang="en-GB" sz="1100" dirty="0"/>
               <a:t>)</a:t>
             </a:r>
           </a:p>
           <a:p>
             <a:pPr lvl="1"/>
             <a:r>
-              <a:rPr lang="en-US" dirty="0" err="1" smtClean="0"/>
-              <a:t>Allinea</a:t>
-            </a:r>
-            <a:r>
-              <a:rPr lang="en-US" dirty="0" smtClean="0"/>
-              <a:t> DDT: parallel debugger</a:t>
+              <a:rPr lang="en-US" dirty="0"/>
+              <a:t>DDT: parallel debugger</a:t>
             </a:r>
           </a:p>
           <a:p>
             <a:pPr lvl="1"/>
             <a:r>
-              <a:rPr lang="en-US" dirty="0" err="1" smtClean="0"/>
-              <a:t>Allinea</a:t>
-            </a:r>
-            <a:r>
-              <a:rPr lang="en-US" dirty="0" smtClean="0"/>
-              <a:t> MAP: parallel profiler</a:t>
-            </a:r>
-          </a:p>
-          <a:p>
-            <a:r>
-              <a:rPr lang="en-US" dirty="0" smtClean="0"/>
+              <a:rPr lang="en-US" dirty="0"/>
+              <a:t>MAP: parallel profiler</a:t>
+            </a:r>
+          </a:p>
+          <a:p>
+            <a:r>
+              <a:rPr lang="en-US" dirty="0"/>
               <a:t>Commercial product</a:t>
             </a:r>
           </a:p>
           <a:p>
             <a:pPr lvl="1"/>
             <a:r>
-              <a:rPr lang="en-US" dirty="0" smtClean="0"/>
+              <a:rPr lang="en-US" dirty="0"/>
               <a:t>Floating </a:t>
             </a:r>
             <a:r>
-              <a:rPr lang="en-US" dirty="0" err="1" smtClean="0"/>
+              <a:rPr lang="en-US" dirty="0" err="1"/>
               <a:t>licence</a:t>
             </a:r>
             <a:r>
-              <a:rPr lang="en-US" dirty="0" smtClean="0"/>
+              <a:rPr lang="en-US" dirty="0"/>
               <a:t>, token based</a:t>
             </a:r>
           </a:p>
           <a:p>
             <a:pPr lvl="1"/>
             <a:r>
-              <a:rPr lang="en-US" dirty="0" smtClean="0"/>
+              <a:rPr lang="en-US" dirty="0"/>
               <a:t>64 tokens, e.g.,</a:t>
             </a:r>
           </a:p>
           <a:p>
             <a:pPr lvl="2"/>
             <a:r>
-              <a:rPr lang="en-US" dirty="0" smtClean="0"/>
+              <a:rPr lang="en-US" dirty="0"/>
               <a:t>2 </a:t>
-            </a:r>
-            <a:r>
-              <a:rPr lang="en-US" dirty="0" smtClean="0">
-                <a:sym typeface="Symbol" panose="05050102010706020507" pitchFamily="18" charset="2"/>
-              </a:rPr>
-              <a:t></a:t>
-            </a:r>
-            <a:r>
-              <a:rPr lang="en-US" dirty="0" smtClean="0"/>
-              <a:t> 2 MAP sessions of 32 processes</a:t>
-            </a:r>
-          </a:p>
-          <a:p>
-            <a:pPr lvl="2"/>
-            <a:r>
-              <a:rPr lang="en-US" dirty="0" smtClean="0"/>
-              <a:t>1 </a:t>
-            </a:r>
-            <a:r>
-              <a:rPr lang="en-US" dirty="0" smtClean="0">
-                <a:sym typeface="Symbol" panose="05050102010706020507" pitchFamily="18" charset="2"/>
-              </a:rPr>
-              <a:t> </a:t>
-            </a:r>
-            <a:r>
-              <a:rPr lang="en-US" dirty="0" smtClean="0"/>
-              <a:t>MAP + 1</a:t>
-            </a:r>
-            <a:r>
-              <a:rPr lang="en-US" dirty="0"/>
-              <a:t> </a:t>
             </a:r>
             <a:r>
               <a:rPr lang="en-US" dirty="0">
@@ -11936,19 +11779,25 @@
               <a:t></a:t>
             </a:r>
             <a:r>
-              <a:rPr lang="en-US" dirty="0" smtClean="0"/>
-              <a:t> DDT session of 32 processes</a:t>
+              <a:rPr lang="en-US" dirty="0"/>
+              <a:t> 2 MAP sessions of 32 processes</a:t>
             </a:r>
           </a:p>
           <a:p>
             <a:pPr lvl="2"/>
             <a:r>
-              <a:rPr lang="en-US" dirty="0" smtClean="0"/>
-              <a:t>1</a:t>
-            </a:r>
-            <a:r>
               <a:rPr lang="en-US" dirty="0"/>
-              <a:t> </a:t>
+              <a:t>1 </a:t>
+            </a:r>
+            <a:r>
+              <a:rPr lang="en-US" dirty="0">
+                <a:sym typeface="Symbol" panose="05050102010706020507" pitchFamily="18" charset="2"/>
+              </a:rPr>
+              <a:t> </a:t>
+            </a:r>
+            <a:r>
+              <a:rPr lang="en-US" dirty="0"/>
+              <a:t>MAP + 1 </a:t>
             </a:r>
             <a:r>
               <a:rPr lang="en-US" dirty="0">
@@ -11957,7 +11806,24 @@
               <a:t></a:t>
             </a:r>
             <a:r>
-              <a:rPr lang="en-US" dirty="0" smtClean="0"/>
+              <a:rPr lang="en-US" dirty="0"/>
+              <a:t> DDT session of 32 processes</a:t>
+            </a:r>
+          </a:p>
+          <a:p>
+            <a:pPr lvl="2"/>
+            <a:r>
+              <a:rPr lang="en-US" dirty="0"/>
+              <a:t>1 </a:t>
+            </a:r>
+            <a:r>
+              <a:rPr lang="en-US" dirty="0">
+                <a:sym typeface="Symbol" panose="05050102010706020507" pitchFamily="18" charset="2"/>
+              </a:rPr>
+              <a:t></a:t>
+            </a:r>
+            <a:r>
+              <a:rPr lang="en-US" dirty="0"/>
               <a:t> DDT session of 64 processes</a:t>
             </a:r>
             <a:endParaRPr lang="nl-BE" dirty="0"/>
@@ -12015,7 +11881,7 @@
           <a:lstStyle/>
           <a:p>
             <a:r>
-              <a:rPr lang="en-US" sz="2000" dirty="0" smtClean="0"/>
+              <a:rPr lang="en-US" sz="2000" dirty="0"/>
               <a:t>Analyzing a profile offline: half price</a:t>
             </a:r>
             <a:endParaRPr lang="nl-BE" sz="2000" dirty="0"/>
@@ -12465,7 +12331,7 @@
           <a:lstStyle/>
           <a:p>
             <a:r>
-              <a:rPr lang="en-US" dirty="0" smtClean="0"/>
+              <a:rPr lang="en-US" dirty="0"/>
               <a:t>Supported programming models</a:t>
             </a:r>
             <a:endParaRPr lang="nl-BE" dirty="0"/>
@@ -12488,37 +12354,32 @@
           <a:lstStyle/>
           <a:p>
             <a:r>
-              <a:rPr lang="en-US" dirty="0" smtClean="0"/>
+              <a:rPr lang="en-US" dirty="0"/>
               <a:t>Serial applications</a:t>
             </a:r>
           </a:p>
           <a:p>
             <a:r>
-              <a:rPr lang="en-US" dirty="0" smtClean="0"/>
+              <a:rPr lang="en-US" dirty="0"/>
               <a:t>Shared memory programming: </a:t>
             </a:r>
             <a:r>
-              <a:rPr lang="en-US" dirty="0" err="1" smtClean="0"/>
+              <a:rPr lang="en-US" dirty="0" err="1"/>
               <a:t>OpenMP</a:t>
             </a:r>
-            <a:endParaRPr lang="en-US" dirty="0" smtClean="0"/>
-          </a:p>
-          <a:p>
-            <a:r>
-              <a:rPr lang="en-US" dirty="0" smtClean="0"/>
+            <a:endParaRPr lang="en-US" dirty="0"/>
+          </a:p>
+          <a:p>
+            <a:r>
+              <a:rPr lang="en-US" dirty="0"/>
               <a:t>GPU programming: CUDA</a:t>
             </a:r>
           </a:p>
           <a:p>
             <a:r>
               <a:rPr lang="en-US" dirty="0"/>
-              <a:t>Distributed programming: </a:t>
-            </a:r>
-            <a:r>
-              <a:rPr lang="en-US" dirty="0" smtClean="0"/>
-              <a:t>MPI, UPC</a:t>
-            </a:r>
-            <a:endParaRPr lang="en-US" dirty="0"/>
+              <a:t>Distributed programming: MPI, UPC</a:t>
+            </a:r>
           </a:p>
           <a:p>
             <a:pPr marL="0" indent="0">
@@ -12579,7 +12440,7 @@
           <a:lstStyle/>
           <a:p>
             <a:r>
-              <a:rPr lang="en-US" sz="2400" dirty="0" smtClean="0"/>
+              <a:rPr lang="en-US" sz="2400" dirty="0"/>
               <a:t>Debugging/profiling at scale: user interface optimized</a:t>
             </a:r>
             <a:endParaRPr lang="nl-BE" sz="2400" dirty="0"/>
@@ -12614,7 +12475,7 @@
           <a:lstStyle/>
           <a:p>
             <a:r>
-              <a:rPr lang="en-US" sz="2400" dirty="0" smtClean="0">
+              <a:rPr lang="en-US" sz="2400" dirty="0">
                 <a:solidFill>
                   <a:srgbClr val="C00000"/>
                 </a:solidFill>
@@ -12622,7 +12483,7 @@
               <a:t>Weapon of choice for MPI (+ </a:t>
             </a:r>
             <a:r>
-              <a:rPr lang="en-US" sz="2400" dirty="0" err="1" smtClean="0">
+              <a:rPr lang="en-US" sz="2400" dirty="0" err="1">
                 <a:solidFill>
                   <a:srgbClr val="C00000"/>
                 </a:solidFill>
@@ -12630,7 +12491,7 @@
               <a:t>OpenMP</a:t>
             </a:r>
             <a:r>
-              <a:rPr lang="en-US" sz="2400" dirty="0" smtClean="0">
+              <a:rPr lang="en-US" sz="2400" dirty="0">
                 <a:solidFill>
                   <a:srgbClr val="C00000"/>
                 </a:solidFill>
@@ -13015,7 +12876,7 @@
           <a:lstStyle/>
           <a:p>
             <a:r>
-              <a:rPr lang="en-US" dirty="0" smtClean="0"/>
+              <a:rPr lang="en-US" dirty="0"/>
               <a:t>Alternatives</a:t>
             </a:r>
             <a:endParaRPr lang="nl-BE" dirty="0"/>
@@ -13038,89 +12899,89 @@
           <a:lstStyle/>
           <a:p>
             <a:r>
-              <a:rPr lang="en-US" dirty="0" smtClean="0"/>
+              <a:rPr lang="en-US" dirty="0"/>
               <a:t>Debugging</a:t>
             </a:r>
           </a:p>
           <a:p>
             <a:pPr lvl="1"/>
             <a:r>
-              <a:rPr lang="en-US" dirty="0" smtClean="0"/>
+              <a:rPr lang="en-US" dirty="0"/>
               <a:t>Commercial: </a:t>
             </a:r>
             <a:r>
-              <a:rPr lang="en-US" dirty="0" err="1" smtClean="0">
+              <a:rPr lang="en-US" dirty="0" err="1">
                 <a:hlinkClick r:id="rId2"/>
               </a:rPr>
               <a:t>RogueWave</a:t>
             </a:r>
             <a:r>
-              <a:rPr lang="en-US" dirty="0" smtClean="0">
+              <a:rPr lang="en-US" dirty="0">
                 <a:hlinkClick r:id="rId2"/>
               </a:rPr>
               <a:t> </a:t>
             </a:r>
             <a:r>
-              <a:rPr lang="en-US" dirty="0" err="1" smtClean="0">
+              <a:rPr lang="en-US" dirty="0" err="1">
                 <a:hlinkClick r:id="rId2"/>
               </a:rPr>
               <a:t>TotalView</a:t>
             </a:r>
-            <a:endParaRPr lang="en-US" dirty="0" smtClean="0"/>
+            <a:endParaRPr lang="en-US" dirty="0"/>
           </a:p>
           <a:p>
             <a:pPr lvl="1"/>
             <a:r>
-              <a:rPr lang="en-US" dirty="0" smtClean="0"/>
+              <a:rPr lang="en-US" dirty="0"/>
               <a:t>Open source: </a:t>
             </a:r>
             <a:r>
-              <a:rPr lang="en-US" dirty="0" smtClean="0">
+              <a:rPr lang="en-US" dirty="0">
                 <a:hlinkClick r:id="rId3"/>
               </a:rPr>
               <a:t>Eclipse PTP</a:t>
             </a:r>
-            <a:endParaRPr lang="en-US" dirty="0" smtClean="0"/>
-          </a:p>
-          <a:p>
-            <a:r>
-              <a:rPr lang="en-US" dirty="0" smtClean="0"/>
+            <a:endParaRPr lang="en-US" dirty="0"/>
+          </a:p>
+          <a:p>
+            <a:r>
+              <a:rPr lang="en-US" dirty="0"/>
               <a:t>Profiling</a:t>
             </a:r>
           </a:p>
           <a:p>
             <a:pPr lvl="1"/>
             <a:r>
-              <a:rPr lang="en-US" dirty="0" smtClean="0"/>
+              <a:rPr lang="en-US" dirty="0"/>
               <a:t>Open source:</a:t>
             </a:r>
           </a:p>
           <a:p>
             <a:pPr lvl="2"/>
             <a:r>
-              <a:rPr lang="en-US" dirty="0" err="1" smtClean="0">
+              <a:rPr lang="en-US" dirty="0" err="1">
                 <a:hlinkClick r:id="rId4"/>
               </a:rPr>
               <a:t>Scalasca</a:t>
             </a:r>
-            <a:endParaRPr lang="en-US" dirty="0" smtClean="0"/>
+            <a:endParaRPr lang="en-US" dirty="0"/>
           </a:p>
           <a:p>
             <a:pPr lvl="2"/>
             <a:r>
-              <a:rPr lang="en-US" dirty="0" err="1" smtClean="0">
+              <a:rPr lang="en-US" dirty="0" err="1">
                 <a:hlinkClick r:id="rId4"/>
               </a:rPr>
               <a:t>Paraver</a:t>
             </a:r>
             <a:r>
-              <a:rPr lang="en-US" dirty="0" smtClean="0">
+              <a:rPr lang="en-US" dirty="0">
                 <a:hlinkClick r:id="rId4"/>
               </a:rPr>
               <a:t> + </a:t>
             </a:r>
             <a:r>
-              <a:rPr lang="en-US" dirty="0" err="1" smtClean="0">
+              <a:rPr lang="en-US" dirty="0" err="1">
                 <a:hlinkClick r:id="rId4"/>
               </a:rPr>
               <a:t>Extrae</a:t>
@@ -13487,7 +13348,7 @@
           <a:lstStyle/>
           <a:p>
             <a:r>
-              <a:rPr lang="en-US" dirty="0" smtClean="0"/>
+              <a:rPr lang="en-US" dirty="0"/>
               <a:t>Profiling</a:t>
             </a:r>
             <a:endParaRPr lang="nl-BE" dirty="0"/>
@@ -13546,13 +13407,6 @@
   <p:clrMapOvr>
     <a:masterClrMapping/>
   </p:clrMapOvr>
-  <p:timing>
-    <p:tnLst>
-      <p:par>
-        <p:cTn id="1" dur="indefinite" restart="never" nodeType="tmRoot"/>
-      </p:par>
-    </p:tnLst>
-  </p:timing>
 </p:sld>
 </file>
 
@@ -13589,10 +13443,9 @@
           <a:lstStyle/>
           <a:p>
             <a:r>
-              <a:rPr lang="en-US" dirty="0" smtClean="0"/>
+              <a:rPr lang="en-US" dirty="0"/>
               <a:t>Workflow</a:t>
             </a:r>
-            <a:endParaRPr lang="en-US" dirty="0"/>
           </a:p>
         </p:txBody>
       </p:sp>
@@ -13614,92 +13467,92 @@
           <a:lstStyle/>
           <a:p>
             <a:r>
-              <a:rPr lang="en-US" dirty="0" smtClean="0"/>
+              <a:rPr lang="en-US" dirty="0"/>
               <a:t>Concentrate on single node</a:t>
             </a:r>
           </a:p>
           <a:p>
             <a:pPr lvl="1"/>
             <a:r>
-              <a:rPr lang="en-US" dirty="0" smtClean="0"/>
+              <a:rPr lang="en-US" dirty="0"/>
               <a:t>profile &amp; analyze bottlenecks</a:t>
             </a:r>
           </a:p>
           <a:p>
             <a:pPr lvl="2"/>
             <a:r>
-              <a:rPr lang="en-US" dirty="0" smtClean="0"/>
+              <a:rPr lang="en-US" dirty="0"/>
               <a:t>memory access?</a:t>
             </a:r>
           </a:p>
           <a:p>
             <a:pPr lvl="3"/>
             <a:r>
-              <a:rPr lang="en-US" dirty="0" smtClean="0"/>
+              <a:rPr lang="en-US" dirty="0"/>
               <a:t>cache use?</a:t>
             </a:r>
           </a:p>
           <a:p>
             <a:pPr lvl="2"/>
             <a:r>
-              <a:rPr lang="en-US" dirty="0" smtClean="0"/>
+              <a:rPr lang="en-US" dirty="0"/>
               <a:t>vectorization?</a:t>
             </a:r>
           </a:p>
           <a:p>
             <a:pPr lvl="2"/>
             <a:r>
-              <a:rPr lang="en-US" dirty="0" smtClean="0"/>
+              <a:rPr lang="en-US" dirty="0"/>
               <a:t>branch prediction?</a:t>
             </a:r>
           </a:p>
           <a:p>
             <a:pPr lvl="2"/>
             <a:r>
-              <a:rPr lang="en-US" dirty="0" err="1" smtClean="0"/>
+              <a:rPr lang="en-US" dirty="0" err="1"/>
               <a:t>OpenMP</a:t>
             </a:r>
             <a:r>
-              <a:rPr lang="en-US" dirty="0" smtClean="0"/>
+              <a:rPr lang="en-US" dirty="0"/>
               <a:t> overhead?</a:t>
             </a:r>
           </a:p>
           <a:p>
             <a:r>
-              <a:rPr lang="en-US" dirty="0" smtClean="0"/>
+              <a:rPr lang="en-US" dirty="0"/>
               <a:t>Inter-node communication</a:t>
             </a:r>
           </a:p>
           <a:p>
             <a:pPr lvl="1"/>
             <a:r>
-              <a:rPr lang="en-US" dirty="0" smtClean="0"/>
+              <a:rPr lang="en-US" dirty="0"/>
               <a:t>profile &amp; analyze bottlenecks</a:t>
             </a:r>
           </a:p>
           <a:p>
             <a:pPr lvl="2"/>
             <a:r>
-              <a:rPr lang="en-US" dirty="0" smtClean="0"/>
+              <a:rPr lang="en-US" dirty="0"/>
               <a:t>granularity of communication/computation?</a:t>
             </a:r>
           </a:p>
           <a:p>
             <a:pPr lvl="3"/>
             <a:r>
-              <a:rPr lang="en-US" dirty="0" smtClean="0"/>
+              <a:rPr lang="en-US" dirty="0"/>
               <a:t>domain decomposition?</a:t>
             </a:r>
           </a:p>
           <a:p>
             <a:pPr lvl="2"/>
             <a:r>
-              <a:rPr lang="en-US" dirty="0" smtClean="0"/>
+              <a:rPr lang="en-US" dirty="0"/>
               <a:t>suboptimal MPI calls?</a:t>
             </a:r>
           </a:p>
           <a:p>
-            <a:endParaRPr lang="en-US" dirty="0" smtClean="0"/>
+            <a:endParaRPr lang="en-US" dirty="0"/>
           </a:p>
           <a:p>
             <a:pPr lvl="1"/>
@@ -13740,13 +13593,6 @@
   <p:clrMapOvr>
     <a:masterClrMapping/>
   </p:clrMapOvr>
-  <p:timing>
-    <p:tnLst>
-      <p:par>
-        <p:cTn id="1" dur="indefinite" restart="never" nodeType="tmRoot"/>
-      </p:par>
-    </p:tnLst>
-  </p:timing>
 </p:sld>
 </file>
 
@@ -13783,7 +13629,7 @@
           <a:lstStyle/>
           <a:p>
             <a:r>
-              <a:rPr lang="en-US" dirty="0" smtClean="0"/>
+              <a:rPr lang="en-US" dirty="0"/>
               <a:t>Methodology</a:t>
             </a:r>
             <a:endParaRPr lang="nl-BE" dirty="0"/>
@@ -13806,94 +13652,94 @@
           <a:lstStyle/>
           <a:p>
             <a:r>
-              <a:rPr lang="en-US" dirty="0" smtClean="0"/>
+              <a:rPr lang="en-US" dirty="0"/>
               <a:t>MAP uses </a:t>
             </a:r>
             <a:r>
-              <a:rPr lang="en-US" dirty="0" smtClean="0">
+              <a:rPr lang="en-US" dirty="0">
                 <a:hlinkClick r:id="rId2"/>
               </a:rPr>
               <a:t>sampling</a:t>
             </a:r>
             <a:r>
-              <a:rPr lang="en-US" dirty="0" smtClean="0"/>
+              <a:rPr lang="en-US" dirty="0"/>
               <a:t> (call stack)</a:t>
             </a:r>
           </a:p>
           <a:p>
             <a:pPr lvl="1"/>
             <a:r>
-              <a:rPr lang="en-US" dirty="0" smtClean="0"/>
+              <a:rPr lang="en-US" dirty="0"/>
               <a:t>No instrumentation</a:t>
             </a:r>
           </a:p>
           <a:p>
             <a:pPr lvl="1"/>
             <a:r>
-              <a:rPr lang="en-US" dirty="0" smtClean="0"/>
+              <a:rPr lang="en-US" dirty="0"/>
               <a:t>Simply compile with </a:t>
             </a:r>
             <a:r>
-              <a:rPr lang="en-US" dirty="0" smtClean="0">
+              <a:rPr lang="en-US" dirty="0">
                 <a:latin typeface="Courier New" panose="02070309020205020404" pitchFamily="49" charset="0"/>
                 <a:cs typeface="Courier New" panose="02070309020205020404" pitchFamily="49" charset="0"/>
               </a:rPr>
               <a:t>-</a:t>
             </a:r>
             <a:r>
-              <a:rPr lang="en-US" dirty="0" smtClean="0"/>
+              <a:rPr lang="en-US" dirty="0"/>
               <a:t>g for details</a:t>
             </a:r>
           </a:p>
           <a:p>
             <a:pPr lvl="1"/>
             <a:r>
-              <a:rPr lang="en-US" dirty="0" smtClean="0"/>
+              <a:rPr lang="en-US" dirty="0"/>
               <a:t>Overhead is minimal (</a:t>
             </a:r>
             <a:r>
-              <a:rPr lang="en-US" dirty="0" smtClean="0">
+              <a:rPr lang="en-US" dirty="0">
                 <a:sym typeface="Symbol" panose="05050102010706020507" pitchFamily="18" charset="2"/>
               </a:rPr>
               <a:t></a:t>
             </a:r>
             <a:r>
-              <a:rPr lang="en-US" dirty="0" smtClean="0"/>
+              <a:rPr lang="en-US" dirty="0"/>
               <a:t>  5-10 % at most)</a:t>
             </a:r>
           </a:p>
           <a:p>
             <a:r>
-              <a:rPr lang="en-US" dirty="0" smtClean="0"/>
+              <a:rPr lang="en-US" dirty="0"/>
               <a:t>Works with many MPI implementations</a:t>
             </a:r>
           </a:p>
           <a:p>
             <a:pPr lvl="1"/>
             <a:r>
-              <a:rPr lang="en-US" dirty="0" smtClean="0"/>
+              <a:rPr lang="en-US" dirty="0"/>
               <a:t>Intel MPI</a:t>
             </a:r>
           </a:p>
           <a:p>
             <a:pPr lvl="1"/>
             <a:r>
-              <a:rPr lang="en-US" dirty="0" err="1" smtClean="0"/>
+              <a:rPr lang="en-US" dirty="0" err="1"/>
               <a:t>OpenMPI</a:t>
             </a:r>
-            <a:endParaRPr lang="en-US" dirty="0" smtClean="0"/>
+            <a:endParaRPr lang="en-US" dirty="0"/>
           </a:p>
           <a:p>
             <a:pPr lvl="1"/>
             <a:r>
-              <a:rPr lang="en-US" dirty="0" smtClean="0"/>
+              <a:rPr lang="en-US" dirty="0"/>
               <a:t>MVAPICH</a:t>
             </a:r>
           </a:p>
           <a:p>
             <a:pPr lvl="1"/>
             <a:r>
-              <a:rPr lang="en-US" dirty="0" smtClean="0"/>
+              <a:rPr lang="en-US" dirty="0"/>
               <a:t>…</a:t>
             </a:r>
             <a:endParaRPr lang="nl-BE" dirty="0"/>
@@ -14374,7 +14220,7 @@
           <a:lstStyle/>
           <a:p>
             <a:r>
-              <a:rPr lang="en-US" dirty="0" smtClean="0"/>
+              <a:rPr lang="en-US" dirty="0"/>
               <a:t>Startup</a:t>
             </a:r>
             <a:endParaRPr lang="nl-BE" dirty="0"/>
@@ -14429,7 +14275,7 @@
           <a:lstStyle/>
           <a:p>
             <a:r>
-              <a:rPr lang="en-US" b="1" dirty="0" smtClean="0">
+              <a:rPr lang="en-US" b="1" dirty="0">
                 <a:solidFill>
                   <a:schemeClr val="bg1"/>
                 </a:solidFill>
@@ -14437,14 +14283,14 @@
               <a:t>$  module load </a:t>
             </a:r>
             <a:r>
-              <a:rPr lang="en-US" b="1" dirty="0" err="1" smtClean="0">
+              <a:rPr lang="en-US" b="1" dirty="0" err="1">
                 <a:solidFill>
                   <a:schemeClr val="bg1"/>
                 </a:solidFill>
               </a:rPr>
               <a:t>AllineaForge</a:t>
             </a:r>
-            <a:endParaRPr lang="en-US" b="1" dirty="0" smtClean="0">
+            <a:endParaRPr lang="en-US" b="1" dirty="0">
               <a:solidFill>
                 <a:schemeClr val="bg1"/>
               </a:solidFill>
@@ -14452,7 +14298,7 @@
           </a:p>
           <a:p>
             <a:r>
-              <a:rPr lang="en-US" b="1" dirty="0" smtClean="0">
+              <a:rPr lang="en-US" b="1" dirty="0">
                 <a:solidFill>
                   <a:schemeClr val="bg1"/>
                 </a:solidFill>
@@ -14580,7 +14426,7 @@
             <a:lstStyle/>
             <a:p>
               <a:r>
-                <a:rPr lang="en-US" dirty="0" smtClean="0"/>
+                <a:rPr lang="en-US" dirty="0"/>
                 <a:t>Start profiling interactively</a:t>
               </a:r>
               <a:endParaRPr lang="nl-BE" dirty="0"/>
@@ -14684,7 +14530,7 @@
             <a:p>
               <a:pPr algn="ctr"/>
               <a:r>
-                <a:rPr lang="en-US" dirty="0" smtClean="0"/>
+                <a:rPr lang="en-US" dirty="0"/>
                 <a:t>```</a:t>
               </a:r>
               <a:endParaRPr lang="nl-BE" dirty="0"/>
@@ -14714,7 +14560,7 @@
             <a:lstStyle/>
             <a:p>
               <a:r>
-                <a:rPr lang="en-US" dirty="0" smtClean="0"/>
+                <a:rPr lang="en-US" dirty="0"/>
                 <a:t>Load a profile to analyze</a:t>
               </a:r>
               <a:endParaRPr lang="nl-BE" dirty="0"/>
@@ -14844,14 +14690,14 @@
             <a:lstStyle/>
             <a:p>
               <a:r>
-                <a:rPr lang="en-US" dirty="0" smtClean="0"/>
+                <a:rPr lang="en-US" dirty="0"/>
                 <a:t>Start a job to profile</a:t>
               </a:r>
               <a:br>
-                <a:rPr lang="en-US" dirty="0" smtClean="0"/>
+                <a:rPr lang="en-US" dirty="0"/>
               </a:br>
               <a:r>
-                <a:rPr lang="en-US" dirty="0" smtClean="0"/>
+                <a:rPr lang="en-US" dirty="0"/>
                 <a:t>interactively</a:t>
               </a:r>
               <a:endParaRPr lang="nl-BE" dirty="0"/>

</xml_diff>

<commit_message>
Fix MAP licensing remark
MAP no longer reqquires license tokens when analyzing a recorded profile.
</commit_message>
<xml_diff>
--- a/arm-map/allinea_map.pptx
+++ b/arm-map/allinea_map.pptx
@@ -218,7 +218,7 @@
           <a:p>
             <a:fld id="{DCBCB4EF-AF11-42C5-A407-C6B5B92B4E13}" type="datetimeFigureOut">
               <a:rPr lang="nl-BE" smtClean="0"/>
-              <a:t>28/01/2020</a:t>
+              <a:t>11/02/2020</a:t>
             </a:fld>
             <a:endParaRPr lang="nl-BE"/>
           </a:p>
@@ -701,7 +701,7 @@
           <a:p>
             <a:fld id="{16EF12B4-B810-4A0E-8BE8-50A63E57FF46}" type="datetime1">
               <a:rPr lang="nl-BE" smtClean="0"/>
-              <a:t>28/01/2020</a:t>
+              <a:t>11/02/2020</a:t>
             </a:fld>
             <a:endParaRPr lang="nl-BE"/>
           </a:p>
@@ -871,7 +871,7 @@
           <a:p>
             <a:fld id="{1C4C54F0-81EA-4EDD-8D8A-D45FC20BB49D}" type="datetime1">
               <a:rPr lang="nl-BE" smtClean="0"/>
-              <a:t>28/01/2020</a:t>
+              <a:t>11/02/2020</a:t>
             </a:fld>
             <a:endParaRPr lang="nl-BE"/>
           </a:p>
@@ -1051,7 +1051,7 @@
           <a:p>
             <a:fld id="{C777687B-F7A2-4048-B084-F43AE07119BE}" type="datetime1">
               <a:rPr lang="nl-BE" smtClean="0"/>
-              <a:t>28/01/2020</a:t>
+              <a:t>11/02/2020</a:t>
             </a:fld>
             <a:endParaRPr lang="nl-BE"/>
           </a:p>
@@ -1221,7 +1221,7 @@
           <a:p>
             <a:fld id="{17D68A66-8CE0-4AE5-B09A-AFB1DA1D35B7}" type="datetime1">
               <a:rPr lang="nl-BE" smtClean="0"/>
-              <a:t>28/01/2020</a:t>
+              <a:t>11/02/2020</a:t>
             </a:fld>
             <a:endParaRPr lang="nl-BE"/>
           </a:p>
@@ -1465,7 +1465,7 @@
           <a:p>
             <a:fld id="{ACD2EF45-07D9-47DD-8D2C-044FB9A2A8C8}" type="datetime1">
               <a:rPr lang="nl-BE" smtClean="0"/>
-              <a:t>28/01/2020</a:t>
+              <a:t>11/02/2020</a:t>
             </a:fld>
             <a:endParaRPr lang="nl-BE"/>
           </a:p>
@@ -1697,7 +1697,7 @@
           <a:p>
             <a:fld id="{C1AA2C35-BB49-44DC-82C3-3BD7F8F0132B}" type="datetime1">
               <a:rPr lang="nl-BE" smtClean="0"/>
-              <a:t>28/01/2020</a:t>
+              <a:t>11/02/2020</a:t>
             </a:fld>
             <a:endParaRPr lang="nl-BE"/>
           </a:p>
@@ -2064,7 +2064,7 @@
           <a:p>
             <a:fld id="{EF292103-E950-40E9-A111-1A108610AB2D}" type="datetime1">
               <a:rPr lang="nl-BE" smtClean="0"/>
-              <a:t>28/01/2020</a:t>
+              <a:t>11/02/2020</a:t>
             </a:fld>
             <a:endParaRPr lang="nl-BE"/>
           </a:p>
@@ -2182,7 +2182,7 @@
           <a:p>
             <a:fld id="{C309520F-DE14-43BC-AF22-FA4B0586587C}" type="datetime1">
               <a:rPr lang="nl-BE" smtClean="0"/>
-              <a:t>28/01/2020</a:t>
+              <a:t>11/02/2020</a:t>
             </a:fld>
             <a:endParaRPr lang="nl-BE"/>
           </a:p>
@@ -2277,7 +2277,7 @@
           <a:p>
             <a:fld id="{89A75246-50AD-43D4-AC8F-C9CEFC06F414}" type="datetime1">
               <a:rPr lang="nl-BE" smtClean="0"/>
-              <a:t>28/01/2020</a:t>
+              <a:t>11/02/2020</a:t>
             </a:fld>
             <a:endParaRPr lang="nl-BE"/>
           </a:p>
@@ -2554,7 +2554,7 @@
           <a:p>
             <a:fld id="{8D0AC96A-CB4C-447A-BAE9-CD71E5D3E387}" type="datetime1">
               <a:rPr lang="nl-BE" smtClean="0"/>
-              <a:t>28/01/2020</a:t>
+              <a:t>11/02/2020</a:t>
             </a:fld>
             <a:endParaRPr lang="nl-BE"/>
           </a:p>
@@ -2811,7 +2811,7 @@
           <a:p>
             <a:fld id="{8EF713C0-6057-4AAB-80ED-C8B012F691C2}" type="datetime1">
               <a:rPr lang="nl-BE" smtClean="0"/>
-              <a:t>28/01/2020</a:t>
+              <a:t>11/02/2020</a:t>
             </a:fld>
             <a:endParaRPr lang="nl-BE"/>
           </a:p>
@@ -3024,7 +3024,7 @@
           <a:p>
             <a:fld id="{67CEDA06-6E27-4D36-9084-23ECECD0BA0D}" type="datetime1">
               <a:rPr lang="nl-BE" smtClean="0"/>
-              <a:t>28/01/2020</a:t>
+              <a:t>11/02/2020</a:t>
             </a:fld>
             <a:endParaRPr lang="nl-BE"/>
           </a:p>
@@ -11701,7 +11701,7 @@
         <p:spPr/>
         <p:txBody>
           <a:bodyPr>
-            <a:normAutofit/>
+            <a:normAutofit lnSpcReduction="10000"/>
           </a:bodyPr>
           <a:lstStyle/>
           <a:p>
@@ -11780,7 +11780,7 @@
             </a:r>
             <a:r>
               <a:rPr lang="en-US" dirty="0"/>
-              <a:t> 2 MAP sessions of 32 processes</a:t>
+              <a:t> MAP session of 32 processes</a:t>
             </a:r>
           </a:p>
           <a:p>
@@ -11825,6 +11825,40 @@
             <a:r>
               <a:rPr lang="en-US" dirty="0"/>
               <a:t> DDT session of 64 processes</a:t>
+            </a:r>
+          </a:p>
+          <a:p>
+            <a:pPr lvl="2"/>
+            <a:r>
+              <a:rPr lang="en-US" dirty="0"/>
+              <a:t>1 </a:t>
+            </a:r>
+            <a:r>
+              <a:rPr lang="en-US" dirty="0">
+                <a:sym typeface="Symbol" panose="05050102010706020507" pitchFamily="18" charset="2"/>
+              </a:rPr>
+              <a:t></a:t>
+            </a:r>
+            <a:r>
+              <a:rPr lang="en-US" dirty="0"/>
+              <a:t> MAP session of 32 processes + 2 </a:t>
+            </a:r>
+            <a:r>
+              <a:rPr lang="en-US" dirty="0">
+                <a:sym typeface="Symbol" panose="05050102010706020507" pitchFamily="18" charset="2"/>
+              </a:rPr>
+              <a:t></a:t>
+            </a:r>
+            <a:r>
+              <a:rPr lang="en-US" dirty="0"/>
+              <a:t> DDT session of 16 processes</a:t>
+            </a:r>
+          </a:p>
+          <a:p>
+            <a:pPr lvl="2"/>
+            <a:r>
+              <a:rPr lang="en-US"/>
+              <a:t>…</a:t>
             </a:r>
             <a:endParaRPr lang="nl-BE" dirty="0"/>
           </a:p>
@@ -11850,41 +11884,6 @@
               <a:t>3</a:t>
             </a:fld>
             <a:endParaRPr lang="nl-BE"/>
-          </a:p>
-        </p:txBody>
-      </p:sp>
-      <p:sp>
-        <p:nvSpPr>
-          <p:cNvPr id="5" name="TextBox 4"/>
-          <p:cNvSpPr txBox="1"/>
-          <p:nvPr/>
-        </p:nvSpPr>
-        <p:spPr>
-          <a:xfrm>
-            <a:off x="1293962" y="5581290"/>
-            <a:ext cx="3928576" cy="400110"/>
-          </a:xfrm>
-          <a:prstGeom prst="rect">
-            <a:avLst/>
-          </a:prstGeom>
-          <a:noFill/>
-          <a:ln>
-            <a:solidFill>
-              <a:schemeClr val="tx1"/>
-            </a:solidFill>
-          </a:ln>
-        </p:spPr>
-        <p:txBody>
-          <a:bodyPr wrap="none" rtlCol="0">
-            <a:spAutoFit/>
-          </a:bodyPr>
-          <a:lstStyle/>
-          <a:p>
-            <a:r>
-              <a:rPr lang="en-US" sz="2000" dirty="0"/>
-              <a:t>Analyzing a profile offline: half price</a:t>
-            </a:r>
-            <a:endParaRPr lang="nl-BE" sz="2000" dirty="0"/>
           </a:p>
         </p:txBody>
       </p:sp>
@@ -12218,26 +12217,39 @@
                                   </p:childTnLst>
                                 </p:cTn>
                               </p:par>
-                            </p:childTnLst>
-                          </p:cTn>
-                        </p:par>
-                      </p:childTnLst>
-                    </p:cTn>
-                  </p:par>
-                  <p:par>
-                    <p:cTn id="25" fill="hold">
-                      <p:stCondLst>
-                        <p:cond delay="indefinite"/>
-                      </p:stCondLst>
-                      <p:childTnLst>
-                        <p:par>
-                          <p:cTn id="26" fill="hold">
-                            <p:stCondLst>
-                              <p:cond delay="0"/>
-                            </p:stCondLst>
-                            <p:childTnLst>
                               <p:par>
-                                <p:cTn id="27" presetID="1" presetClass="entr" presetSubtype="0" fill="hold" grpId="0" nodeType="clickEffect">
+                                <p:cTn id="25" presetID="1" presetClass="entr" presetSubtype="0" fill="hold" grpId="0" nodeType="withEffect">
+                                  <p:stCondLst>
+                                    <p:cond delay="0"/>
+                                  </p:stCondLst>
+                                  <p:childTnLst>
+                                    <p:set>
+                                      <p:cBhvr>
+                                        <p:cTn id="26" dur="1" fill="hold">
+                                          <p:stCondLst>
+                                            <p:cond delay="0"/>
+                                          </p:stCondLst>
+                                        </p:cTn>
+                                        <p:tgtEl>
+                                          <p:spTgt spid="3">
+                                            <p:txEl>
+                                              <p:pRg st="9" end="9"/>
+                                            </p:txEl>
+                                          </p:spTgt>
+                                        </p:tgtEl>
+                                        <p:attrNameLst>
+                                          <p:attrName>style.visibility</p:attrName>
+                                        </p:attrNameLst>
+                                      </p:cBhvr>
+                                      <p:to>
+                                        <p:strVal val="visible"/>
+                                      </p:to>
+                                    </p:set>
+                                  </p:childTnLst>
+                                </p:cTn>
+                              </p:par>
+                              <p:par>
+                                <p:cTn id="27" presetID="1" presetClass="entr" presetSubtype="0" fill="hold" grpId="0" nodeType="withEffect">
                                   <p:stCondLst>
                                     <p:cond delay="0"/>
                                   </p:stCondLst>
@@ -12250,7 +12262,11 @@
                                           </p:stCondLst>
                                         </p:cTn>
                                         <p:tgtEl>
-                                          <p:spTgt spid="5"/>
+                                          <p:spTgt spid="3">
+                                            <p:txEl>
+                                              <p:pRg st="10" end="10"/>
+                                            </p:txEl>
+                                          </p:spTgt>
                                         </p:tgtEl>
                                         <p:attrNameLst>
                                           <p:attrName>style.visibility</p:attrName>
@@ -12292,7 +12308,6 @@
     </p:tnLst>
     <p:bldLst>
       <p:bldP spid="3" grpId="0" uiExpand="1" build="p"/>
-      <p:bldP spid="5" grpId="0" animBg="1"/>
     </p:bldLst>
   </p:timing>
 </p:sld>

</xml_diff>